<commit_message>
Adding NgRX to the project
</commit_message>
<xml_diff>
--- a/1_Angular.pptx
+++ b/1_Angular.pptx
@@ -4,6 +4,9 @@
   <p:sldMasterIdLst>
     <p:sldMasterId id="2147483648" r:id="rId1"/>
   </p:sldMasterIdLst>
+  <p:notesMasterIdLst>
+    <p:notesMasterId r:id="rId55"/>
+  </p:notesMasterIdLst>
   <p:sldIdLst>
     <p:sldId id="268" r:id="rId2"/>
     <p:sldId id="267" r:id="rId3"/>
@@ -47,6 +50,17 @@
     <p:sldId id="314" r:id="rId41"/>
     <p:sldId id="310" r:id="rId42"/>
     <p:sldId id="311" r:id="rId43"/>
+    <p:sldId id="315" r:id="rId44"/>
+    <p:sldId id="316" r:id="rId45"/>
+    <p:sldId id="318" r:id="rId46"/>
+    <p:sldId id="317" r:id="rId47"/>
+    <p:sldId id="319" r:id="rId48"/>
+    <p:sldId id="320" r:id="rId49"/>
+    <p:sldId id="321" r:id="rId50"/>
+    <p:sldId id="324" r:id="rId51"/>
+    <p:sldId id="323" r:id="rId52"/>
+    <p:sldId id="326" r:id="rId53"/>
+    <p:sldId id="322" r:id="rId54"/>
   </p:sldIdLst>
   <p:sldSz cx="12192000" cy="6858000"/>
   <p:notesSz cx="6858000" cy="9144000"/>
@@ -153,6 +167,439 @@
 </p:presentation>
 </file>
 
+<file path=ppt/notesMasters/notesMaster1.xml><?xml version="1.0" encoding="utf-8"?>
+<p:notesMaster xmlns:a="http://schemas.openxmlformats.org/drawingml/2006/main" xmlns:r="http://schemas.openxmlformats.org/officeDocument/2006/relationships" xmlns:p="http://schemas.openxmlformats.org/presentationml/2006/main">
+  <p:cSld>
+    <p:bg>
+      <p:bgRef idx="1001">
+        <a:schemeClr val="bg1"/>
+      </p:bgRef>
+    </p:bg>
+    <p:spTree>
+      <p:nvGrpSpPr>
+        <p:cNvPr id="1" name=""/>
+        <p:cNvGrpSpPr/>
+        <p:nvPr/>
+      </p:nvGrpSpPr>
+      <p:grpSpPr>
+        <a:xfrm>
+          <a:off x="0" y="0"/>
+          <a:ext cx="0" cy="0"/>
+          <a:chOff x="0" y="0"/>
+          <a:chExt cx="0" cy="0"/>
+        </a:xfrm>
+      </p:grpSpPr>
+      <p:sp>
+        <p:nvSpPr>
+          <p:cNvPr id="2" name="Header Placeholder 1"/>
+          <p:cNvSpPr>
+            <a:spLocks noGrp="1"/>
+          </p:cNvSpPr>
+          <p:nvPr>
+            <p:ph type="hdr" sz="quarter"/>
+          </p:nvPr>
+        </p:nvSpPr>
+        <p:spPr>
+          <a:xfrm>
+            <a:off x="0" y="0"/>
+            <a:ext cx="2971800" cy="458788"/>
+          </a:xfrm>
+          <a:prstGeom prst="rect">
+            <a:avLst/>
+          </a:prstGeom>
+        </p:spPr>
+        <p:txBody>
+          <a:bodyPr vert="horz" lIns="91440" tIns="45720" rIns="91440" bIns="45720" rtlCol="0"/>
+          <a:lstStyle>
+            <a:lvl1pPr algn="l">
+              <a:defRPr sz="1200"/>
+            </a:lvl1pPr>
+          </a:lstStyle>
+          <a:p>
+            <a:endParaRPr lang="en-US"/>
+          </a:p>
+        </p:txBody>
+      </p:sp>
+      <p:sp>
+        <p:nvSpPr>
+          <p:cNvPr id="3" name="Date Placeholder 2"/>
+          <p:cNvSpPr>
+            <a:spLocks noGrp="1"/>
+          </p:cNvSpPr>
+          <p:nvPr>
+            <p:ph type="dt" idx="1"/>
+          </p:nvPr>
+        </p:nvSpPr>
+        <p:spPr>
+          <a:xfrm>
+            <a:off x="3884613" y="0"/>
+            <a:ext cx="2971800" cy="458788"/>
+          </a:xfrm>
+          <a:prstGeom prst="rect">
+            <a:avLst/>
+          </a:prstGeom>
+        </p:spPr>
+        <p:txBody>
+          <a:bodyPr vert="horz" lIns="91440" tIns="45720" rIns="91440" bIns="45720" rtlCol="0"/>
+          <a:lstStyle>
+            <a:lvl1pPr algn="r">
+              <a:defRPr sz="1200"/>
+            </a:lvl1pPr>
+          </a:lstStyle>
+          <a:p>
+            <a:fld id="{92DB92BE-E1A1-48E5-99F3-5A9F5832766A}" type="datetimeFigureOut">
+              <a:rPr lang="en-US" smtClean="0"/>
+              <a:t>2/11/2025</a:t>
+            </a:fld>
+            <a:endParaRPr lang="en-US"/>
+          </a:p>
+        </p:txBody>
+      </p:sp>
+      <p:sp>
+        <p:nvSpPr>
+          <p:cNvPr id="4" name="Slide Image Placeholder 3"/>
+          <p:cNvSpPr>
+            <a:spLocks noGrp="1" noRot="1" noChangeAspect="1"/>
+          </p:cNvSpPr>
+          <p:nvPr>
+            <p:ph type="sldImg" idx="2"/>
+          </p:nvPr>
+        </p:nvSpPr>
+        <p:spPr>
+          <a:xfrm>
+            <a:off x="685800" y="1143000"/>
+            <a:ext cx="5486400" cy="3086100"/>
+          </a:xfrm>
+          <a:prstGeom prst="rect">
+            <a:avLst/>
+          </a:prstGeom>
+          <a:noFill/>
+          <a:ln w="12700">
+            <a:solidFill>
+              <a:prstClr val="black"/>
+            </a:solidFill>
+          </a:ln>
+        </p:spPr>
+        <p:txBody>
+          <a:bodyPr vert="horz" lIns="91440" tIns="45720" rIns="91440" bIns="45720" rtlCol="0" anchor="ctr"/>
+          <a:lstStyle/>
+          <a:p>
+            <a:endParaRPr lang="en-US"/>
+          </a:p>
+        </p:txBody>
+      </p:sp>
+      <p:sp>
+        <p:nvSpPr>
+          <p:cNvPr id="5" name="Notes Placeholder 4"/>
+          <p:cNvSpPr>
+            <a:spLocks noGrp="1"/>
+          </p:cNvSpPr>
+          <p:nvPr>
+            <p:ph type="body" sz="quarter" idx="3"/>
+          </p:nvPr>
+        </p:nvSpPr>
+        <p:spPr>
+          <a:xfrm>
+            <a:off x="685800" y="4400550"/>
+            <a:ext cx="5486400" cy="3600450"/>
+          </a:xfrm>
+          <a:prstGeom prst="rect">
+            <a:avLst/>
+          </a:prstGeom>
+        </p:spPr>
+        <p:txBody>
+          <a:bodyPr vert="horz" lIns="91440" tIns="45720" rIns="91440" bIns="45720" rtlCol="0"/>
+          <a:lstStyle/>
+          <a:p>
+            <a:pPr lvl="0"/>
+            <a:r>
+              <a:rPr lang="en-US"/>
+              <a:t>Click to edit Master text styles</a:t>
+            </a:r>
+          </a:p>
+          <a:p>
+            <a:pPr lvl="1"/>
+            <a:r>
+              <a:rPr lang="en-US"/>
+              <a:t>Second level</a:t>
+            </a:r>
+          </a:p>
+          <a:p>
+            <a:pPr lvl="2"/>
+            <a:r>
+              <a:rPr lang="en-US"/>
+              <a:t>Third level</a:t>
+            </a:r>
+          </a:p>
+          <a:p>
+            <a:pPr lvl="3"/>
+            <a:r>
+              <a:rPr lang="en-US"/>
+              <a:t>Fourth level</a:t>
+            </a:r>
+          </a:p>
+          <a:p>
+            <a:pPr lvl="4"/>
+            <a:r>
+              <a:rPr lang="en-US"/>
+              <a:t>Fifth level</a:t>
+            </a:r>
+          </a:p>
+        </p:txBody>
+      </p:sp>
+      <p:sp>
+        <p:nvSpPr>
+          <p:cNvPr id="6" name="Footer Placeholder 5"/>
+          <p:cNvSpPr>
+            <a:spLocks noGrp="1"/>
+          </p:cNvSpPr>
+          <p:nvPr>
+            <p:ph type="ftr" sz="quarter" idx="4"/>
+          </p:nvPr>
+        </p:nvSpPr>
+        <p:spPr>
+          <a:xfrm>
+            <a:off x="0" y="8685213"/>
+            <a:ext cx="2971800" cy="458787"/>
+          </a:xfrm>
+          <a:prstGeom prst="rect">
+            <a:avLst/>
+          </a:prstGeom>
+        </p:spPr>
+        <p:txBody>
+          <a:bodyPr vert="horz" lIns="91440" tIns="45720" rIns="91440" bIns="45720" rtlCol="0" anchor="b"/>
+          <a:lstStyle>
+            <a:lvl1pPr algn="l">
+              <a:defRPr sz="1200"/>
+            </a:lvl1pPr>
+          </a:lstStyle>
+          <a:p>
+            <a:endParaRPr lang="en-US"/>
+          </a:p>
+        </p:txBody>
+      </p:sp>
+      <p:sp>
+        <p:nvSpPr>
+          <p:cNvPr id="7" name="Slide Number Placeholder 6"/>
+          <p:cNvSpPr>
+            <a:spLocks noGrp="1"/>
+          </p:cNvSpPr>
+          <p:nvPr>
+            <p:ph type="sldNum" sz="quarter" idx="5"/>
+          </p:nvPr>
+        </p:nvSpPr>
+        <p:spPr>
+          <a:xfrm>
+            <a:off x="3884613" y="8685213"/>
+            <a:ext cx="2971800" cy="458787"/>
+          </a:xfrm>
+          <a:prstGeom prst="rect">
+            <a:avLst/>
+          </a:prstGeom>
+        </p:spPr>
+        <p:txBody>
+          <a:bodyPr vert="horz" lIns="91440" tIns="45720" rIns="91440" bIns="45720" rtlCol="0" anchor="b"/>
+          <a:lstStyle>
+            <a:lvl1pPr algn="r">
+              <a:defRPr sz="1200"/>
+            </a:lvl1pPr>
+          </a:lstStyle>
+          <a:p>
+            <a:fld id="{A32EB774-DDBF-4A6B-A0B4-706F0EFD15E1}" type="slidenum">
+              <a:rPr lang="en-US" smtClean="0"/>
+              <a:t>‹#›</a:t>
+            </a:fld>
+            <a:endParaRPr lang="en-US"/>
+          </a:p>
+        </p:txBody>
+      </p:sp>
+    </p:spTree>
+    <p:extLst>
+      <p:ext uri="{BB962C8B-B14F-4D97-AF65-F5344CB8AC3E}">
+        <p14:creationId xmlns:p14="http://schemas.microsoft.com/office/powerpoint/2010/main" val="3273534512"/>
+      </p:ext>
+    </p:extLst>
+  </p:cSld>
+  <p:clrMap bg1="lt1" tx1="dk1" bg2="lt2" tx2="dk2" accent1="accent1" accent2="accent2" accent3="accent3" accent4="accent4" accent5="accent5" accent6="accent6" hlink="hlink" folHlink="folHlink"/>
+  <p:notesStyle>
+    <a:lvl1pPr marL="0" algn="l" defTabSz="914400" rtl="0" eaLnBrk="1" latinLnBrk="0" hangingPunct="1">
+      <a:defRPr sz="1200" kern="1200">
+        <a:solidFill>
+          <a:schemeClr val="tx1"/>
+        </a:solidFill>
+        <a:latin typeface="+mn-lt"/>
+        <a:ea typeface="+mn-ea"/>
+        <a:cs typeface="+mn-cs"/>
+      </a:defRPr>
+    </a:lvl1pPr>
+    <a:lvl2pPr marL="457200" algn="l" defTabSz="914400" rtl="0" eaLnBrk="1" latinLnBrk="0" hangingPunct="1">
+      <a:defRPr sz="1200" kern="1200">
+        <a:solidFill>
+          <a:schemeClr val="tx1"/>
+        </a:solidFill>
+        <a:latin typeface="+mn-lt"/>
+        <a:ea typeface="+mn-ea"/>
+        <a:cs typeface="+mn-cs"/>
+      </a:defRPr>
+    </a:lvl2pPr>
+    <a:lvl3pPr marL="914400" algn="l" defTabSz="914400" rtl="0" eaLnBrk="1" latinLnBrk="0" hangingPunct="1">
+      <a:defRPr sz="1200" kern="1200">
+        <a:solidFill>
+          <a:schemeClr val="tx1"/>
+        </a:solidFill>
+        <a:latin typeface="+mn-lt"/>
+        <a:ea typeface="+mn-ea"/>
+        <a:cs typeface="+mn-cs"/>
+      </a:defRPr>
+    </a:lvl3pPr>
+    <a:lvl4pPr marL="1371600" algn="l" defTabSz="914400" rtl="0" eaLnBrk="1" latinLnBrk="0" hangingPunct="1">
+      <a:defRPr sz="1200" kern="1200">
+        <a:solidFill>
+          <a:schemeClr val="tx1"/>
+        </a:solidFill>
+        <a:latin typeface="+mn-lt"/>
+        <a:ea typeface="+mn-ea"/>
+        <a:cs typeface="+mn-cs"/>
+      </a:defRPr>
+    </a:lvl4pPr>
+    <a:lvl5pPr marL="1828800" algn="l" defTabSz="914400" rtl="0" eaLnBrk="1" latinLnBrk="0" hangingPunct="1">
+      <a:defRPr sz="1200" kern="1200">
+        <a:solidFill>
+          <a:schemeClr val="tx1"/>
+        </a:solidFill>
+        <a:latin typeface="+mn-lt"/>
+        <a:ea typeface="+mn-ea"/>
+        <a:cs typeface="+mn-cs"/>
+      </a:defRPr>
+    </a:lvl5pPr>
+    <a:lvl6pPr marL="2286000" algn="l" defTabSz="914400" rtl="0" eaLnBrk="1" latinLnBrk="0" hangingPunct="1">
+      <a:defRPr sz="1200" kern="1200">
+        <a:solidFill>
+          <a:schemeClr val="tx1"/>
+        </a:solidFill>
+        <a:latin typeface="+mn-lt"/>
+        <a:ea typeface="+mn-ea"/>
+        <a:cs typeface="+mn-cs"/>
+      </a:defRPr>
+    </a:lvl6pPr>
+    <a:lvl7pPr marL="2743200" algn="l" defTabSz="914400" rtl="0" eaLnBrk="1" latinLnBrk="0" hangingPunct="1">
+      <a:defRPr sz="1200" kern="1200">
+        <a:solidFill>
+          <a:schemeClr val="tx1"/>
+        </a:solidFill>
+        <a:latin typeface="+mn-lt"/>
+        <a:ea typeface="+mn-ea"/>
+        <a:cs typeface="+mn-cs"/>
+      </a:defRPr>
+    </a:lvl7pPr>
+    <a:lvl8pPr marL="3200400" algn="l" defTabSz="914400" rtl="0" eaLnBrk="1" latinLnBrk="0" hangingPunct="1">
+      <a:defRPr sz="1200" kern="1200">
+        <a:solidFill>
+          <a:schemeClr val="tx1"/>
+        </a:solidFill>
+        <a:latin typeface="+mn-lt"/>
+        <a:ea typeface="+mn-ea"/>
+        <a:cs typeface="+mn-cs"/>
+      </a:defRPr>
+    </a:lvl8pPr>
+    <a:lvl9pPr marL="3657600" algn="l" defTabSz="914400" rtl="0" eaLnBrk="1" latinLnBrk="0" hangingPunct="1">
+      <a:defRPr sz="1200" kern="1200">
+        <a:solidFill>
+          <a:schemeClr val="tx1"/>
+        </a:solidFill>
+        <a:latin typeface="+mn-lt"/>
+        <a:ea typeface="+mn-ea"/>
+        <a:cs typeface="+mn-cs"/>
+      </a:defRPr>
+    </a:lvl9pPr>
+  </p:notesStyle>
+</p:notesMaster>
+</file>
+
+<file path=ppt/notesSlides/notesSlide1.xml><?xml version="1.0" encoding="utf-8"?>
+<p:notes xmlns:a="http://schemas.openxmlformats.org/drawingml/2006/main" xmlns:r="http://schemas.openxmlformats.org/officeDocument/2006/relationships" xmlns:p="http://schemas.openxmlformats.org/presentationml/2006/main">
+  <p:cSld>
+    <p:spTree>
+      <p:nvGrpSpPr>
+        <p:cNvPr id="1" name=""/>
+        <p:cNvGrpSpPr/>
+        <p:nvPr/>
+      </p:nvGrpSpPr>
+      <p:grpSpPr>
+        <a:xfrm>
+          <a:off x="0" y="0"/>
+          <a:ext cx="0" cy="0"/>
+          <a:chOff x="0" y="0"/>
+          <a:chExt cx="0" cy="0"/>
+        </a:xfrm>
+      </p:grpSpPr>
+      <p:sp>
+        <p:nvSpPr>
+          <p:cNvPr id="2" name="Slide Image Placeholder 1"/>
+          <p:cNvSpPr>
+            <a:spLocks noGrp="1" noRot="1" noChangeAspect="1"/>
+          </p:cNvSpPr>
+          <p:nvPr>
+            <p:ph type="sldImg"/>
+          </p:nvPr>
+        </p:nvSpPr>
+        <p:spPr/>
+      </p:sp>
+      <p:sp>
+        <p:nvSpPr>
+          <p:cNvPr id="3" name="Notes Placeholder 2"/>
+          <p:cNvSpPr>
+            <a:spLocks noGrp="1"/>
+          </p:cNvSpPr>
+          <p:nvPr>
+            <p:ph type="body" idx="1"/>
+          </p:nvPr>
+        </p:nvSpPr>
+        <p:spPr/>
+        <p:txBody>
+          <a:bodyPr/>
+          <a:lstStyle/>
+          <a:p>
+            <a:endParaRPr lang="en-US"/>
+          </a:p>
+        </p:txBody>
+      </p:sp>
+      <p:sp>
+        <p:nvSpPr>
+          <p:cNvPr id="4" name="Slide Number Placeholder 3"/>
+          <p:cNvSpPr>
+            <a:spLocks noGrp="1"/>
+          </p:cNvSpPr>
+          <p:nvPr>
+            <p:ph type="sldNum" sz="quarter" idx="5"/>
+          </p:nvPr>
+        </p:nvSpPr>
+        <p:spPr/>
+        <p:txBody>
+          <a:bodyPr/>
+          <a:lstStyle/>
+          <a:p>
+            <a:fld id="{A32EB774-DDBF-4A6B-A0B4-706F0EFD15E1}" type="slidenum">
+              <a:rPr lang="en-US" smtClean="0"/>
+              <a:t>1</a:t>
+            </a:fld>
+            <a:endParaRPr lang="en-US"/>
+          </a:p>
+        </p:txBody>
+      </p:sp>
+    </p:spTree>
+    <p:extLst>
+      <p:ext uri="{BB962C8B-B14F-4D97-AF65-F5344CB8AC3E}">
+        <p14:creationId xmlns:p14="http://schemas.microsoft.com/office/powerpoint/2010/main" val="3990973688"/>
+      </p:ext>
+    </p:extLst>
+  </p:cSld>
+  <p:clrMapOvr>
+    <a:masterClrMapping/>
+  </p:clrMapOvr>
+</p:notes>
+</file>
+
 <file path=ppt/slideLayouts/slideLayout1.xml><?xml version="1.0" encoding="utf-8"?>
 <p:sldLayout xmlns:a="http://schemas.openxmlformats.org/drawingml/2006/main" xmlns:r="http://schemas.openxmlformats.org/officeDocument/2006/relationships" xmlns:p="http://schemas.openxmlformats.org/presentationml/2006/main" type="title" preserve="1">
   <p:cSld name="Title Slide">
@@ -300,7 +747,7 @@
           <a:p>
             <a:fld id="{EECBD699-7A79-4FA7-996C-E5C2C0144205}" type="datetimeFigureOut">
               <a:rPr lang="en-US" smtClean="0"/>
-              <a:t>1/21/2025</a:t>
+              <a:t>2/11/2025</a:t>
             </a:fld>
             <a:endParaRPr lang="en-US"/>
           </a:p>
@@ -498,7 +945,7 @@
           <a:p>
             <a:fld id="{EECBD699-7A79-4FA7-996C-E5C2C0144205}" type="datetimeFigureOut">
               <a:rPr lang="en-US" smtClean="0"/>
-              <a:t>1/21/2025</a:t>
+              <a:t>2/11/2025</a:t>
             </a:fld>
             <a:endParaRPr lang="en-US"/>
           </a:p>
@@ -706,7 +1153,7 @@
           <a:p>
             <a:fld id="{EECBD699-7A79-4FA7-996C-E5C2C0144205}" type="datetimeFigureOut">
               <a:rPr lang="en-US" smtClean="0"/>
-              <a:t>1/21/2025</a:t>
+              <a:t>2/11/2025</a:t>
             </a:fld>
             <a:endParaRPr lang="en-US"/>
           </a:p>
@@ -904,7 +1351,7 @@
           <a:p>
             <a:fld id="{EECBD699-7A79-4FA7-996C-E5C2C0144205}" type="datetimeFigureOut">
               <a:rPr lang="en-US" smtClean="0"/>
-              <a:t>1/21/2025</a:t>
+              <a:t>2/11/2025</a:t>
             </a:fld>
             <a:endParaRPr lang="en-US"/>
           </a:p>
@@ -1179,7 +1626,7 @@
           <a:p>
             <a:fld id="{EECBD699-7A79-4FA7-996C-E5C2C0144205}" type="datetimeFigureOut">
               <a:rPr lang="en-US" smtClean="0"/>
-              <a:t>1/21/2025</a:t>
+              <a:t>2/11/2025</a:t>
             </a:fld>
             <a:endParaRPr lang="en-US"/>
           </a:p>
@@ -1444,7 +1891,7 @@
           <a:p>
             <a:fld id="{EECBD699-7A79-4FA7-996C-E5C2C0144205}" type="datetimeFigureOut">
               <a:rPr lang="en-US" smtClean="0"/>
-              <a:t>1/21/2025</a:t>
+              <a:t>2/11/2025</a:t>
             </a:fld>
             <a:endParaRPr lang="en-US"/>
           </a:p>
@@ -1856,7 +2303,7 @@
           <a:p>
             <a:fld id="{EECBD699-7A79-4FA7-996C-E5C2C0144205}" type="datetimeFigureOut">
               <a:rPr lang="en-US" smtClean="0"/>
-              <a:t>1/21/2025</a:t>
+              <a:t>2/11/2025</a:t>
             </a:fld>
             <a:endParaRPr lang="en-US"/>
           </a:p>
@@ -1997,7 +2444,7 @@
           <a:p>
             <a:fld id="{EECBD699-7A79-4FA7-996C-E5C2C0144205}" type="datetimeFigureOut">
               <a:rPr lang="en-US" smtClean="0"/>
-              <a:t>1/21/2025</a:t>
+              <a:t>2/11/2025</a:t>
             </a:fld>
             <a:endParaRPr lang="en-US"/>
           </a:p>
@@ -2110,7 +2557,7 @@
           <a:p>
             <a:fld id="{EECBD699-7A79-4FA7-996C-E5C2C0144205}" type="datetimeFigureOut">
               <a:rPr lang="en-US" smtClean="0"/>
-              <a:t>1/21/2025</a:t>
+              <a:t>2/11/2025</a:t>
             </a:fld>
             <a:endParaRPr lang="en-US"/>
           </a:p>
@@ -2421,7 +2868,7 @@
           <a:p>
             <a:fld id="{EECBD699-7A79-4FA7-996C-E5C2C0144205}" type="datetimeFigureOut">
               <a:rPr lang="en-US" smtClean="0"/>
-              <a:t>1/21/2025</a:t>
+              <a:t>2/11/2025</a:t>
             </a:fld>
             <a:endParaRPr lang="en-US"/>
           </a:p>
@@ -2709,7 +3156,7 @@
           <a:p>
             <a:fld id="{EECBD699-7A79-4FA7-996C-E5C2C0144205}" type="datetimeFigureOut">
               <a:rPr lang="en-US" smtClean="0"/>
-              <a:t>1/21/2025</a:t>
+              <a:t>2/11/2025</a:t>
             </a:fld>
             <a:endParaRPr lang="en-US"/>
           </a:p>
@@ -2950,7 +3397,7 @@
           <a:p>
             <a:fld id="{EECBD699-7A79-4FA7-996C-E5C2C0144205}" type="datetimeFigureOut">
               <a:rPr lang="en-US" smtClean="0"/>
-              <a:t>1/21/2025</a:t>
+              <a:t>2/11/2025</a:t>
             </a:fld>
             <a:endParaRPr lang="en-US"/>
           </a:p>
@@ -13412,6 +13859,1561 @@
 </p:sld>
 </file>
 
+<file path=ppt/slides/slide43.xml><?xml version="1.0" encoding="utf-8"?>
+<p:sld xmlns:a="http://schemas.openxmlformats.org/drawingml/2006/main" xmlns:r="http://schemas.openxmlformats.org/officeDocument/2006/relationships" xmlns:p="http://schemas.openxmlformats.org/presentationml/2006/main">
+  <p:cSld>
+    <p:spTree>
+      <p:nvGrpSpPr>
+        <p:cNvPr id="1" name=""/>
+        <p:cNvGrpSpPr/>
+        <p:nvPr/>
+      </p:nvGrpSpPr>
+      <p:grpSpPr>
+        <a:xfrm>
+          <a:off x="0" y="0"/>
+          <a:ext cx="0" cy="0"/>
+          <a:chOff x="0" y="0"/>
+          <a:chExt cx="0" cy="0"/>
+        </a:xfrm>
+      </p:grpSpPr>
+      <p:sp>
+        <p:nvSpPr>
+          <p:cNvPr id="2" name="Title 1">
+            <a:extLst>
+              <a:ext uri="{FF2B5EF4-FFF2-40B4-BE49-F238E27FC236}">
+                <a16:creationId xmlns:a16="http://schemas.microsoft.com/office/drawing/2014/main" id="{0F3F56CA-C931-67D7-6382-29F1CF339A1F}"/>
+              </a:ext>
+            </a:extLst>
+          </p:cNvPr>
+          <p:cNvSpPr>
+            <a:spLocks noGrp="1"/>
+          </p:cNvSpPr>
+          <p:nvPr>
+            <p:ph type="title"/>
+          </p:nvPr>
+        </p:nvSpPr>
+        <p:spPr/>
+        <p:txBody>
+          <a:bodyPr/>
+          <a:lstStyle/>
+          <a:p>
+            <a:r>
+              <a:rPr lang="en-US" dirty="0" err="1"/>
+              <a:t>NgRX</a:t>
+            </a:r>
+            <a:endParaRPr lang="en-US" dirty="0"/>
+          </a:p>
+        </p:txBody>
+      </p:sp>
+      <p:sp>
+        <p:nvSpPr>
+          <p:cNvPr id="3" name="Content Placeholder 2">
+            <a:extLst>
+              <a:ext uri="{FF2B5EF4-FFF2-40B4-BE49-F238E27FC236}">
+                <a16:creationId xmlns:a16="http://schemas.microsoft.com/office/drawing/2014/main" id="{87EF7DBD-DD82-42F4-40A7-8516331285B8}"/>
+              </a:ext>
+            </a:extLst>
+          </p:cNvPr>
+          <p:cNvSpPr>
+            <a:spLocks noGrp="1"/>
+          </p:cNvSpPr>
+          <p:nvPr>
+            <p:ph idx="1"/>
+          </p:nvPr>
+        </p:nvSpPr>
+        <p:spPr/>
+        <p:txBody>
+          <a:bodyPr>
+            <a:normAutofit lnSpcReduction="10000"/>
+          </a:bodyPr>
+          <a:lstStyle/>
+          <a:p>
+            <a:r>
+              <a:rPr lang="en-US" dirty="0"/>
+              <a:t>State management library.</a:t>
+            </a:r>
+          </a:p>
+          <a:p>
+            <a:r>
+              <a:rPr lang="en-US" dirty="0"/>
+              <a:t>Inspired by REDUX (popular state management library)</a:t>
+            </a:r>
+          </a:p>
+          <a:p>
+            <a:r>
+              <a:rPr lang="en-US" dirty="0"/>
+              <a:t>Follows “UNI Directional Data Flow” principle</a:t>
+            </a:r>
+          </a:p>
+          <a:p>
+            <a:r>
+              <a:rPr lang="en-US" dirty="0"/>
+              <a:t>Provides the building blocks to manage the state of the application in a predictable and scalable manner</a:t>
+            </a:r>
+          </a:p>
+          <a:p>
+            <a:r>
+              <a:rPr lang="en-US" dirty="0"/>
+              <a:t>Building blocks:</a:t>
+            </a:r>
+          </a:p>
+          <a:p>
+            <a:pPr lvl="1"/>
+            <a:r>
+              <a:rPr lang="en-US" dirty="0"/>
+              <a:t>Actions</a:t>
+            </a:r>
+          </a:p>
+          <a:p>
+            <a:pPr lvl="1"/>
+            <a:r>
+              <a:rPr lang="en-US" dirty="0"/>
+              <a:t>Reducers</a:t>
+            </a:r>
+          </a:p>
+          <a:p>
+            <a:pPr lvl="1"/>
+            <a:r>
+              <a:rPr lang="en-US" dirty="0"/>
+              <a:t>Effects</a:t>
+            </a:r>
+          </a:p>
+          <a:p>
+            <a:pPr lvl="1"/>
+            <a:r>
+              <a:rPr lang="en-US" dirty="0"/>
+              <a:t>Selectors</a:t>
+            </a:r>
+          </a:p>
+        </p:txBody>
+      </p:sp>
+    </p:spTree>
+    <p:extLst>
+      <p:ext uri="{BB962C8B-B14F-4D97-AF65-F5344CB8AC3E}">
+        <p14:creationId xmlns:p14="http://schemas.microsoft.com/office/powerpoint/2010/main" val="3442861080"/>
+      </p:ext>
+    </p:extLst>
+  </p:cSld>
+  <p:clrMapOvr>
+    <a:masterClrMapping/>
+  </p:clrMapOvr>
+</p:sld>
+</file>
+
+<file path=ppt/slides/slide44.xml><?xml version="1.0" encoding="utf-8"?>
+<p:sld xmlns:a="http://schemas.openxmlformats.org/drawingml/2006/main" xmlns:r="http://schemas.openxmlformats.org/officeDocument/2006/relationships" xmlns:p="http://schemas.openxmlformats.org/presentationml/2006/main">
+  <p:cSld>
+    <p:bg>
+      <p:bgPr>
+        <a:solidFill>
+          <a:schemeClr val="bg1"/>
+        </a:solidFill>
+        <a:effectLst/>
+      </p:bgPr>
+    </p:bg>
+    <p:spTree>
+      <p:nvGrpSpPr>
+        <p:cNvPr id="1" name=""/>
+        <p:cNvGrpSpPr/>
+        <p:nvPr/>
+      </p:nvGrpSpPr>
+      <p:grpSpPr>
+        <a:xfrm>
+          <a:off x="0" y="0"/>
+          <a:ext cx="0" cy="0"/>
+          <a:chOff x="0" y="0"/>
+          <a:chExt cx="0" cy="0"/>
+        </a:xfrm>
+      </p:grpSpPr>
+      <p:sp useBgFill="1">
+        <p:nvSpPr>
+          <p:cNvPr id="1031" name="Rectangle 1030">
+            <a:extLst>
+              <a:ext uri="{FF2B5EF4-FFF2-40B4-BE49-F238E27FC236}">
+                <a16:creationId xmlns:a16="http://schemas.microsoft.com/office/drawing/2014/main" id="{53F29798-D584-4792-9B62-3F5F5C36D619}"/>
+              </a:ext>
+              <a:ext uri="{C183D7F6-B498-43B3-948B-1728B52AA6E4}">
+                <adec:decorative xmlns:adec="http://schemas.microsoft.com/office/drawing/2017/decorative" val="1"/>
+              </a:ext>
+            </a:extLst>
+          </p:cNvPr>
+          <p:cNvSpPr>
+            <a:spLocks noGrp="1" noRot="1" noChangeAspect="1" noMove="1" noResize="1" noEditPoints="1" noAdjustHandles="1" noChangeArrowheads="1" noChangeShapeType="1" noTextEdit="1"/>
+          </p:cNvSpPr>
+          <p:nvPr>
+            <p:extLst>
+              <p:ext uri="{386F3935-93C4-4BCD-93E2-E3B085C9AB24}">
+                <p16:designElem xmlns:p16="http://schemas.microsoft.com/office/powerpoint/2015/main" val="1"/>
+              </p:ext>
+            </p:extLst>
+          </p:nvPr>
+        </p:nvSpPr>
+        <p:spPr>
+          <a:xfrm>
+            <a:off x="0" y="0"/>
+            <a:ext cx="12188952" cy="6858000"/>
+          </a:xfrm>
+          <a:prstGeom prst="rect">
+            <a:avLst/>
+          </a:prstGeom>
+          <a:ln>
+            <a:noFill/>
+          </a:ln>
+        </p:spPr>
+        <p:style>
+          <a:lnRef idx="2">
+            <a:schemeClr val="accent1">
+              <a:shade val="50000"/>
+            </a:schemeClr>
+          </a:lnRef>
+          <a:fillRef idx="1">
+            <a:schemeClr val="accent1"/>
+          </a:fillRef>
+          <a:effectRef idx="0">
+            <a:schemeClr val="accent1"/>
+          </a:effectRef>
+          <a:fontRef idx="minor">
+            <a:schemeClr val="lt1"/>
+          </a:fontRef>
+        </p:style>
+        <p:txBody>
+          <a:bodyPr rtlCol="0" anchor="ctr"/>
+          <a:lstStyle/>
+          <a:p>
+            <a:pPr algn="ctr"/>
+            <a:endParaRPr lang="en-US"/>
+          </a:p>
+        </p:txBody>
+      </p:sp>
+      <p:sp>
+        <p:nvSpPr>
+          <p:cNvPr id="2" name="Title 1">
+            <a:extLst>
+              <a:ext uri="{FF2B5EF4-FFF2-40B4-BE49-F238E27FC236}">
+                <a16:creationId xmlns:a16="http://schemas.microsoft.com/office/drawing/2014/main" id="{0F3F56CA-C931-67D7-6382-29F1CF339A1F}"/>
+              </a:ext>
+            </a:extLst>
+          </p:cNvPr>
+          <p:cNvSpPr>
+            <a:spLocks noGrp="1"/>
+          </p:cNvSpPr>
+          <p:nvPr>
+            <p:ph type="title"/>
+          </p:nvPr>
+        </p:nvSpPr>
+        <p:spPr>
+          <a:xfrm>
+            <a:off x="838200" y="184805"/>
+            <a:ext cx="10515600" cy="1505883"/>
+          </a:xfrm>
+        </p:spPr>
+        <p:txBody>
+          <a:bodyPr vert="horz" lIns="91440" tIns="45720" rIns="91440" bIns="45720" rtlCol="0" anchor="ctr">
+            <a:normAutofit/>
+          </a:bodyPr>
+          <a:lstStyle/>
+          <a:p>
+            <a:r>
+              <a:rPr lang="en-US" sz="5200" kern="1200">
+                <a:solidFill>
+                  <a:schemeClr val="tx1"/>
+                </a:solidFill>
+                <a:latin typeface="+mj-lt"/>
+                <a:ea typeface="+mj-ea"/>
+                <a:cs typeface="+mj-cs"/>
+              </a:rPr>
+              <a:t>NgRX</a:t>
+            </a:r>
+          </a:p>
+        </p:txBody>
+      </p:sp>
+      <p:pic>
+        <p:nvPicPr>
+          <p:cNvPr id="5" name="Picture 4">
+            <a:extLst>
+              <a:ext uri="{FF2B5EF4-FFF2-40B4-BE49-F238E27FC236}">
+                <a16:creationId xmlns:a16="http://schemas.microsoft.com/office/drawing/2014/main" id="{E46F69ED-1647-302E-F65C-843FEC3A6E4A}"/>
+              </a:ext>
+            </a:extLst>
+          </p:cNvPr>
+          <p:cNvPicPr>
+            <a:picLocks noChangeAspect="1"/>
+          </p:cNvPicPr>
+          <p:nvPr/>
+        </p:nvPicPr>
+        <p:blipFill>
+          <a:blip r:embed="rId2"/>
+          <a:stretch>
+            <a:fillRect/>
+          </a:stretch>
+        </p:blipFill>
+        <p:spPr>
+          <a:xfrm>
+            <a:off x="1536763" y="1451361"/>
+            <a:ext cx="9115425" cy="4724400"/>
+          </a:xfrm>
+          <a:prstGeom prst="rect">
+            <a:avLst/>
+          </a:prstGeom>
+        </p:spPr>
+      </p:pic>
+    </p:spTree>
+    <p:extLst>
+      <p:ext uri="{BB962C8B-B14F-4D97-AF65-F5344CB8AC3E}">
+        <p14:creationId xmlns:p14="http://schemas.microsoft.com/office/powerpoint/2010/main" val="1525142801"/>
+      </p:ext>
+    </p:extLst>
+  </p:cSld>
+  <p:clrMapOvr>
+    <a:masterClrMapping/>
+  </p:clrMapOvr>
+</p:sld>
+</file>
+
+<file path=ppt/slides/slide45.xml><?xml version="1.0" encoding="utf-8"?>
+<p:sld xmlns:a="http://schemas.openxmlformats.org/drawingml/2006/main" xmlns:r="http://schemas.openxmlformats.org/officeDocument/2006/relationships" xmlns:p="http://schemas.openxmlformats.org/presentationml/2006/main">
+  <p:cSld>
+    <p:spTree>
+      <p:nvGrpSpPr>
+        <p:cNvPr id="1" name=""/>
+        <p:cNvGrpSpPr/>
+        <p:nvPr/>
+      </p:nvGrpSpPr>
+      <p:grpSpPr>
+        <a:xfrm>
+          <a:off x="0" y="0"/>
+          <a:ext cx="0" cy="0"/>
+          <a:chOff x="0" y="0"/>
+          <a:chExt cx="0" cy="0"/>
+        </a:xfrm>
+      </p:grpSpPr>
+      <p:sp>
+        <p:nvSpPr>
+          <p:cNvPr id="2" name="Title 1">
+            <a:extLst>
+              <a:ext uri="{FF2B5EF4-FFF2-40B4-BE49-F238E27FC236}">
+                <a16:creationId xmlns:a16="http://schemas.microsoft.com/office/drawing/2014/main" id="{0F3F56CA-C931-67D7-6382-29F1CF339A1F}"/>
+              </a:ext>
+            </a:extLst>
+          </p:cNvPr>
+          <p:cNvSpPr>
+            <a:spLocks noGrp="1"/>
+          </p:cNvSpPr>
+          <p:nvPr>
+            <p:ph type="title"/>
+          </p:nvPr>
+        </p:nvSpPr>
+        <p:spPr/>
+        <p:txBody>
+          <a:bodyPr/>
+          <a:lstStyle/>
+          <a:p>
+            <a:r>
+              <a:rPr lang="en-US" dirty="0" err="1"/>
+              <a:t>NgRX</a:t>
+            </a:r>
+            <a:r>
+              <a:rPr lang="en-US" dirty="0"/>
+              <a:t> - Store</a:t>
+            </a:r>
+          </a:p>
+        </p:txBody>
+      </p:sp>
+      <p:sp>
+        <p:nvSpPr>
+          <p:cNvPr id="3" name="Content Placeholder 2">
+            <a:extLst>
+              <a:ext uri="{FF2B5EF4-FFF2-40B4-BE49-F238E27FC236}">
+                <a16:creationId xmlns:a16="http://schemas.microsoft.com/office/drawing/2014/main" id="{87EF7DBD-DD82-42F4-40A7-8516331285B8}"/>
+              </a:ext>
+            </a:extLst>
+          </p:cNvPr>
+          <p:cNvSpPr>
+            <a:spLocks noGrp="1"/>
+          </p:cNvSpPr>
+          <p:nvPr>
+            <p:ph idx="1"/>
+          </p:nvPr>
+        </p:nvSpPr>
+        <p:spPr/>
+        <p:txBody>
+          <a:bodyPr>
+            <a:normAutofit/>
+          </a:bodyPr>
+          <a:lstStyle/>
+          <a:p>
+            <a:r>
+              <a:rPr lang="en-US" dirty="0"/>
+              <a:t>Application State is saved in “Store”</a:t>
+            </a:r>
+          </a:p>
+          <a:p>
+            <a:r>
+              <a:rPr lang="en-US" dirty="0"/>
+              <a:t>Create a “</a:t>
+            </a:r>
+            <a:r>
+              <a:rPr lang="en-US" dirty="0" err="1"/>
+              <a:t>uni</a:t>
+            </a:r>
+            <a:r>
+              <a:rPr lang="en-US" dirty="0"/>
+              <a:t>-directional data flow” cycle</a:t>
+            </a:r>
+            <a:br>
+              <a:rPr lang="en-US" dirty="0"/>
+            </a:br>
+            <a:r>
+              <a:rPr lang="en-US" dirty="0"/>
+              <a:t>from store to the component</a:t>
+            </a:r>
+          </a:p>
+          <a:p>
+            <a:r>
+              <a:rPr lang="en-US" dirty="0"/>
+              <a:t>Store is mainly for managing global </a:t>
+            </a:r>
+            <a:br>
+              <a:rPr lang="en-US" dirty="0"/>
+            </a:br>
+            <a:r>
+              <a:rPr lang="en-US" dirty="0"/>
+              <a:t>state across an entire application</a:t>
+            </a:r>
+          </a:p>
+        </p:txBody>
+      </p:sp>
+      <p:pic>
+        <p:nvPicPr>
+          <p:cNvPr id="4" name="Picture 3">
+            <a:extLst>
+              <a:ext uri="{FF2B5EF4-FFF2-40B4-BE49-F238E27FC236}">
+                <a16:creationId xmlns:a16="http://schemas.microsoft.com/office/drawing/2014/main" id="{502C8389-AFD3-8FFB-91E0-26021F3EEC58}"/>
+              </a:ext>
+            </a:extLst>
+          </p:cNvPr>
+          <p:cNvPicPr>
+            <a:picLocks noChangeAspect="1"/>
+          </p:cNvPicPr>
+          <p:nvPr/>
+        </p:nvPicPr>
+        <p:blipFill>
+          <a:blip r:embed="rId2"/>
+          <a:stretch>
+            <a:fillRect/>
+          </a:stretch>
+        </p:blipFill>
+        <p:spPr>
+          <a:xfrm>
+            <a:off x="7179030" y="555594"/>
+            <a:ext cx="5012970" cy="2598154"/>
+          </a:xfrm>
+          <a:prstGeom prst="rect">
+            <a:avLst/>
+          </a:prstGeom>
+        </p:spPr>
+      </p:pic>
+      <p:sp>
+        <p:nvSpPr>
+          <p:cNvPr id="5" name="Oval 4">
+            <a:extLst>
+              <a:ext uri="{FF2B5EF4-FFF2-40B4-BE49-F238E27FC236}">
+                <a16:creationId xmlns:a16="http://schemas.microsoft.com/office/drawing/2014/main" id="{7A077143-DD66-550F-3E4E-0829DD793412}"/>
+              </a:ext>
+            </a:extLst>
+          </p:cNvPr>
+          <p:cNvSpPr/>
+          <p:nvPr/>
+        </p:nvSpPr>
+        <p:spPr>
+          <a:xfrm>
+            <a:off x="10151706" y="681037"/>
+            <a:ext cx="242596" cy="242596"/>
+          </a:xfrm>
+          <a:prstGeom prst="ellipse">
+            <a:avLst/>
+          </a:prstGeom>
+          <a:solidFill>
+            <a:srgbClr val="FF0000"/>
+          </a:solidFill>
+        </p:spPr>
+        <p:style>
+          <a:lnRef idx="2">
+            <a:schemeClr val="accent1">
+              <a:shade val="15000"/>
+            </a:schemeClr>
+          </a:lnRef>
+          <a:fillRef idx="1">
+            <a:schemeClr val="accent1"/>
+          </a:fillRef>
+          <a:effectRef idx="0">
+            <a:schemeClr val="accent1"/>
+          </a:effectRef>
+          <a:fontRef idx="minor">
+            <a:schemeClr val="lt1"/>
+          </a:fontRef>
+        </p:style>
+        <p:txBody>
+          <a:bodyPr rtlCol="0" anchor="ctr"/>
+          <a:lstStyle/>
+          <a:p>
+            <a:pPr algn="ctr"/>
+            <a:endParaRPr lang="en-US"/>
+          </a:p>
+        </p:txBody>
+      </p:sp>
+    </p:spTree>
+    <p:extLst>
+      <p:ext uri="{BB962C8B-B14F-4D97-AF65-F5344CB8AC3E}">
+        <p14:creationId xmlns:p14="http://schemas.microsoft.com/office/powerpoint/2010/main" val="2765719309"/>
+      </p:ext>
+    </p:extLst>
+  </p:cSld>
+  <p:clrMapOvr>
+    <a:masterClrMapping/>
+  </p:clrMapOvr>
+</p:sld>
+</file>
+
+<file path=ppt/slides/slide46.xml><?xml version="1.0" encoding="utf-8"?>
+<p:sld xmlns:a="http://schemas.openxmlformats.org/drawingml/2006/main" xmlns:r="http://schemas.openxmlformats.org/officeDocument/2006/relationships" xmlns:p="http://schemas.openxmlformats.org/presentationml/2006/main">
+  <p:cSld>
+    <p:spTree>
+      <p:nvGrpSpPr>
+        <p:cNvPr id="1" name=""/>
+        <p:cNvGrpSpPr/>
+        <p:nvPr/>
+      </p:nvGrpSpPr>
+      <p:grpSpPr>
+        <a:xfrm>
+          <a:off x="0" y="0"/>
+          <a:ext cx="0" cy="0"/>
+          <a:chOff x="0" y="0"/>
+          <a:chExt cx="0" cy="0"/>
+        </a:xfrm>
+      </p:grpSpPr>
+      <p:sp>
+        <p:nvSpPr>
+          <p:cNvPr id="2" name="Title 1">
+            <a:extLst>
+              <a:ext uri="{FF2B5EF4-FFF2-40B4-BE49-F238E27FC236}">
+                <a16:creationId xmlns:a16="http://schemas.microsoft.com/office/drawing/2014/main" id="{0F3F56CA-C931-67D7-6382-29F1CF339A1F}"/>
+              </a:ext>
+            </a:extLst>
+          </p:cNvPr>
+          <p:cNvSpPr>
+            <a:spLocks noGrp="1"/>
+          </p:cNvSpPr>
+          <p:nvPr>
+            <p:ph type="title"/>
+          </p:nvPr>
+        </p:nvSpPr>
+        <p:spPr/>
+        <p:txBody>
+          <a:bodyPr/>
+          <a:lstStyle/>
+          <a:p>
+            <a:r>
+              <a:rPr lang="en-US" dirty="0" err="1"/>
+              <a:t>NgRX</a:t>
+            </a:r>
+            <a:r>
+              <a:rPr lang="en-US" dirty="0"/>
+              <a:t> - Selectors</a:t>
+            </a:r>
+          </a:p>
+        </p:txBody>
+      </p:sp>
+      <p:sp>
+        <p:nvSpPr>
+          <p:cNvPr id="3" name="Content Placeholder 2">
+            <a:extLst>
+              <a:ext uri="{FF2B5EF4-FFF2-40B4-BE49-F238E27FC236}">
+                <a16:creationId xmlns:a16="http://schemas.microsoft.com/office/drawing/2014/main" id="{87EF7DBD-DD82-42F4-40A7-8516331285B8}"/>
+              </a:ext>
+            </a:extLst>
+          </p:cNvPr>
+          <p:cNvSpPr>
+            <a:spLocks noGrp="1"/>
+          </p:cNvSpPr>
+          <p:nvPr>
+            <p:ph idx="1"/>
+          </p:nvPr>
+        </p:nvSpPr>
+        <p:spPr/>
+        <p:txBody>
+          <a:bodyPr>
+            <a:normAutofit lnSpcReduction="10000"/>
+          </a:bodyPr>
+          <a:lstStyle/>
+          <a:p>
+            <a:r>
+              <a:rPr lang="en-US" dirty="0"/>
+              <a:t>Selectors are pure functions used for </a:t>
+            </a:r>
+            <a:br>
+              <a:rPr lang="en-US" dirty="0"/>
+            </a:br>
+            <a:r>
+              <a:rPr lang="en-US" dirty="0"/>
+              <a:t>obtaining slices of store state</a:t>
+            </a:r>
+          </a:p>
+          <a:p>
+            <a:r>
+              <a:rPr lang="en-US" dirty="0"/>
+              <a:t>To select a piece of state based on data </a:t>
+            </a:r>
+            <a:br>
+              <a:rPr lang="en-US" dirty="0"/>
+            </a:br>
+            <a:r>
+              <a:rPr lang="en-US" dirty="0"/>
+              <a:t>you can pass props to the selector function</a:t>
+            </a:r>
+          </a:p>
+          <a:p>
+            <a:r>
+              <a:rPr lang="en-US" dirty="0"/>
+              <a:t>Keep in mind that a selector only keeps the previous input arguments in its cache</a:t>
+            </a:r>
+          </a:p>
+          <a:p>
+            <a:r>
+              <a:rPr lang="en-US" dirty="0"/>
+              <a:t>Selectors empower you to compose a read model for your application state (Command Query Responsibility Segregation (CQRS)) </a:t>
+            </a:r>
+            <a:r>
+              <a:rPr lang="en-US" dirty="0">
+                <a:hlinkClick r:id="rId2"/>
+              </a:rPr>
+              <a:t>Reference</a:t>
+            </a:r>
+            <a:endParaRPr lang="en-US" dirty="0"/>
+          </a:p>
+          <a:p>
+            <a:r>
+              <a:rPr lang="en-US" dirty="0" err="1"/>
+              <a:t>NgRx</a:t>
+            </a:r>
+            <a:r>
+              <a:rPr lang="en-US" dirty="0"/>
+              <a:t> separates the read model (selectors) from the write model (reducers)</a:t>
+            </a:r>
+          </a:p>
+        </p:txBody>
+      </p:sp>
+      <p:pic>
+        <p:nvPicPr>
+          <p:cNvPr id="4" name="Picture 3">
+            <a:extLst>
+              <a:ext uri="{FF2B5EF4-FFF2-40B4-BE49-F238E27FC236}">
+                <a16:creationId xmlns:a16="http://schemas.microsoft.com/office/drawing/2014/main" id="{502C8389-AFD3-8FFB-91E0-26021F3EEC58}"/>
+              </a:ext>
+            </a:extLst>
+          </p:cNvPr>
+          <p:cNvPicPr>
+            <a:picLocks noChangeAspect="1"/>
+          </p:cNvPicPr>
+          <p:nvPr/>
+        </p:nvPicPr>
+        <p:blipFill>
+          <a:blip r:embed="rId3"/>
+          <a:stretch>
+            <a:fillRect/>
+          </a:stretch>
+        </p:blipFill>
+        <p:spPr>
+          <a:xfrm>
+            <a:off x="7179030" y="555594"/>
+            <a:ext cx="5012970" cy="2598154"/>
+          </a:xfrm>
+          <a:prstGeom prst="rect">
+            <a:avLst/>
+          </a:prstGeom>
+        </p:spPr>
+      </p:pic>
+      <p:sp>
+        <p:nvSpPr>
+          <p:cNvPr id="5" name="Oval 4">
+            <a:extLst>
+              <a:ext uri="{FF2B5EF4-FFF2-40B4-BE49-F238E27FC236}">
+                <a16:creationId xmlns:a16="http://schemas.microsoft.com/office/drawing/2014/main" id="{7A077143-DD66-550F-3E4E-0829DD793412}"/>
+              </a:ext>
+            </a:extLst>
+          </p:cNvPr>
+          <p:cNvSpPr/>
+          <p:nvPr/>
+        </p:nvSpPr>
+        <p:spPr>
+          <a:xfrm>
+            <a:off x="7179030" y="785310"/>
+            <a:ext cx="242596" cy="242596"/>
+          </a:xfrm>
+          <a:prstGeom prst="ellipse">
+            <a:avLst/>
+          </a:prstGeom>
+          <a:solidFill>
+            <a:srgbClr val="FF0000"/>
+          </a:solidFill>
+        </p:spPr>
+        <p:style>
+          <a:lnRef idx="2">
+            <a:schemeClr val="accent1">
+              <a:shade val="15000"/>
+            </a:schemeClr>
+          </a:lnRef>
+          <a:fillRef idx="1">
+            <a:schemeClr val="accent1"/>
+          </a:fillRef>
+          <a:effectRef idx="0">
+            <a:schemeClr val="accent1"/>
+          </a:effectRef>
+          <a:fontRef idx="minor">
+            <a:schemeClr val="lt1"/>
+          </a:fontRef>
+        </p:style>
+        <p:txBody>
+          <a:bodyPr rtlCol="0" anchor="ctr"/>
+          <a:lstStyle/>
+          <a:p>
+            <a:pPr algn="ctr"/>
+            <a:endParaRPr lang="en-US"/>
+          </a:p>
+        </p:txBody>
+      </p:sp>
+    </p:spTree>
+    <p:extLst>
+      <p:ext uri="{BB962C8B-B14F-4D97-AF65-F5344CB8AC3E}">
+        <p14:creationId xmlns:p14="http://schemas.microsoft.com/office/powerpoint/2010/main" val="2885576873"/>
+      </p:ext>
+    </p:extLst>
+  </p:cSld>
+  <p:clrMapOvr>
+    <a:masterClrMapping/>
+  </p:clrMapOvr>
+</p:sld>
+</file>
+
+<file path=ppt/slides/slide47.xml><?xml version="1.0" encoding="utf-8"?>
+<p:sld xmlns:a="http://schemas.openxmlformats.org/drawingml/2006/main" xmlns:r="http://schemas.openxmlformats.org/officeDocument/2006/relationships" xmlns:p="http://schemas.openxmlformats.org/presentationml/2006/main">
+  <p:cSld>
+    <p:spTree>
+      <p:nvGrpSpPr>
+        <p:cNvPr id="1" name=""/>
+        <p:cNvGrpSpPr/>
+        <p:nvPr/>
+      </p:nvGrpSpPr>
+      <p:grpSpPr>
+        <a:xfrm>
+          <a:off x="0" y="0"/>
+          <a:ext cx="0" cy="0"/>
+          <a:chOff x="0" y="0"/>
+          <a:chExt cx="0" cy="0"/>
+        </a:xfrm>
+      </p:grpSpPr>
+      <p:sp>
+        <p:nvSpPr>
+          <p:cNvPr id="2" name="Title 1">
+            <a:extLst>
+              <a:ext uri="{FF2B5EF4-FFF2-40B4-BE49-F238E27FC236}">
+                <a16:creationId xmlns:a16="http://schemas.microsoft.com/office/drawing/2014/main" id="{0F3F56CA-C931-67D7-6382-29F1CF339A1F}"/>
+              </a:ext>
+            </a:extLst>
+          </p:cNvPr>
+          <p:cNvSpPr>
+            <a:spLocks noGrp="1"/>
+          </p:cNvSpPr>
+          <p:nvPr>
+            <p:ph type="title"/>
+          </p:nvPr>
+        </p:nvSpPr>
+        <p:spPr/>
+        <p:txBody>
+          <a:bodyPr/>
+          <a:lstStyle/>
+          <a:p>
+            <a:r>
+              <a:rPr lang="en-US" dirty="0" err="1"/>
+              <a:t>NgRX</a:t>
+            </a:r>
+            <a:r>
+              <a:rPr lang="en-US" dirty="0"/>
+              <a:t> - Actions</a:t>
+            </a:r>
+          </a:p>
+        </p:txBody>
+      </p:sp>
+      <p:sp>
+        <p:nvSpPr>
+          <p:cNvPr id="3" name="Content Placeholder 2">
+            <a:extLst>
+              <a:ext uri="{FF2B5EF4-FFF2-40B4-BE49-F238E27FC236}">
+                <a16:creationId xmlns:a16="http://schemas.microsoft.com/office/drawing/2014/main" id="{87EF7DBD-DD82-42F4-40A7-8516331285B8}"/>
+              </a:ext>
+            </a:extLst>
+          </p:cNvPr>
+          <p:cNvSpPr>
+            <a:spLocks noGrp="1"/>
+          </p:cNvSpPr>
+          <p:nvPr>
+            <p:ph idx="1"/>
+          </p:nvPr>
+        </p:nvSpPr>
+        <p:spPr/>
+        <p:txBody>
+          <a:bodyPr>
+            <a:normAutofit/>
+          </a:bodyPr>
+          <a:lstStyle/>
+          <a:p>
+            <a:r>
+              <a:rPr lang="en-US" dirty="0"/>
+              <a:t>Actions describe unique events that </a:t>
+            </a:r>
+            <a:br>
+              <a:rPr lang="en-US" dirty="0"/>
+            </a:br>
+            <a:r>
+              <a:rPr lang="en-US" dirty="0"/>
+              <a:t>are dispatched from components </a:t>
+            </a:r>
+            <a:br>
+              <a:rPr lang="en-US" dirty="0"/>
+            </a:br>
+            <a:r>
+              <a:rPr lang="en-US" dirty="0"/>
+              <a:t>and services</a:t>
+            </a:r>
+          </a:p>
+          <a:p>
+            <a:r>
+              <a:rPr lang="en-US" dirty="0"/>
+              <a:t>Actions help you to understand how </a:t>
+            </a:r>
+            <a:br>
+              <a:rPr lang="en-US" dirty="0"/>
+            </a:br>
+            <a:r>
+              <a:rPr lang="en-US" dirty="0"/>
+              <a:t>events are handled in your application</a:t>
+            </a:r>
+          </a:p>
+          <a:p>
+            <a:r>
+              <a:rPr lang="en-US" dirty="0"/>
+              <a:t>An Action in </a:t>
+            </a:r>
+            <a:r>
+              <a:rPr lang="en-US" dirty="0" err="1"/>
+              <a:t>NgRx</a:t>
+            </a:r>
+            <a:r>
+              <a:rPr lang="en-US" dirty="0"/>
+              <a:t> is made up of a simple interface</a:t>
+            </a:r>
+            <a:br>
+              <a:rPr lang="en-US" dirty="0"/>
+            </a:br>
+            <a:br>
+              <a:rPr lang="en-US" dirty="0"/>
+            </a:br>
+            <a:r>
+              <a:rPr lang="en-US" b="0" i="0" dirty="0" err="1">
+                <a:solidFill>
+                  <a:srgbClr val="D86703"/>
+                </a:solidFill>
+                <a:effectLst/>
+                <a:latin typeface="Droid Sans Mono"/>
+              </a:rPr>
+              <a:t>interface</a:t>
+            </a:r>
+            <a:r>
+              <a:rPr lang="en-US" b="0" i="0" dirty="0">
+                <a:solidFill>
+                  <a:srgbClr val="000000"/>
+                </a:solidFill>
+                <a:effectLst/>
+                <a:latin typeface="Droid Sans Mono"/>
+              </a:rPr>
+              <a:t> </a:t>
+            </a:r>
+            <a:r>
+              <a:rPr lang="en-US" b="0" i="0" u="none" strike="noStrike" dirty="0">
+                <a:solidFill>
+                  <a:srgbClr val="800080"/>
+                </a:solidFill>
+                <a:effectLst/>
+                <a:latin typeface="Droid Sans Mono"/>
+                <a:hlinkClick r:id="rId2"/>
+              </a:rPr>
+              <a:t>Action</a:t>
+            </a:r>
+            <a:r>
+              <a:rPr lang="en-US" b="0" i="0" dirty="0">
+                <a:solidFill>
+                  <a:srgbClr val="000000"/>
+                </a:solidFill>
+                <a:effectLst/>
+                <a:latin typeface="Droid Sans Mono"/>
+              </a:rPr>
+              <a:t> </a:t>
+            </a:r>
+            <a:r>
+              <a:rPr lang="en-US" b="0" i="0" dirty="0">
+                <a:solidFill>
+                  <a:srgbClr val="666600"/>
+                </a:solidFill>
+                <a:effectLst/>
+                <a:latin typeface="Droid Sans Mono"/>
+              </a:rPr>
+              <a:t>{</a:t>
+            </a:r>
+            <a:r>
+              <a:rPr lang="en-US" b="0" i="0" dirty="0">
+                <a:solidFill>
+                  <a:srgbClr val="000000"/>
+                </a:solidFill>
+                <a:effectLst/>
+                <a:latin typeface="Droid Sans Mono"/>
+              </a:rPr>
+              <a:t> </a:t>
+            </a:r>
+            <a:br>
+              <a:rPr lang="en-US" b="0" i="0" dirty="0">
+                <a:solidFill>
+                  <a:srgbClr val="000000"/>
+                </a:solidFill>
+                <a:effectLst/>
+                <a:latin typeface="Droid Sans Mono"/>
+              </a:rPr>
+            </a:br>
+            <a:r>
+              <a:rPr lang="en-US" b="0" i="0" dirty="0">
+                <a:solidFill>
+                  <a:srgbClr val="000000"/>
+                </a:solidFill>
+                <a:effectLst/>
+                <a:latin typeface="Droid Sans Mono"/>
+              </a:rPr>
+              <a:t>  </a:t>
+            </a:r>
+            <a:r>
+              <a:rPr lang="en-US" b="0" i="0" u="none" strike="noStrike" dirty="0">
+                <a:solidFill>
+                  <a:srgbClr val="000000"/>
+                </a:solidFill>
+                <a:effectLst/>
+                <a:latin typeface="Droid Sans Mono"/>
+                <a:hlinkClick r:id="rId3"/>
+              </a:rPr>
+              <a:t>type</a:t>
+            </a:r>
+            <a:r>
+              <a:rPr lang="en-US" b="0" i="0" dirty="0">
+                <a:solidFill>
+                  <a:srgbClr val="666600"/>
+                </a:solidFill>
+                <a:effectLst/>
+                <a:latin typeface="Droid Sans Mono"/>
+              </a:rPr>
+              <a:t>:</a:t>
+            </a:r>
+            <a:r>
+              <a:rPr lang="en-US" b="0" i="0" dirty="0">
+                <a:solidFill>
+                  <a:srgbClr val="000000"/>
+                </a:solidFill>
+                <a:effectLst/>
+                <a:latin typeface="Droid Sans Mono"/>
+              </a:rPr>
+              <a:t> </a:t>
+            </a:r>
+            <a:r>
+              <a:rPr lang="en-US" b="0" i="0" dirty="0">
+                <a:solidFill>
+                  <a:srgbClr val="D86703"/>
+                </a:solidFill>
+                <a:effectLst/>
+                <a:latin typeface="Droid Sans Mono"/>
+              </a:rPr>
+              <a:t>string</a:t>
+            </a:r>
+            <a:r>
+              <a:rPr lang="en-US" b="0" i="0" dirty="0">
+                <a:solidFill>
+                  <a:srgbClr val="666600"/>
+                </a:solidFill>
+                <a:effectLst/>
+                <a:latin typeface="Droid Sans Mono"/>
+              </a:rPr>
+              <a:t>;</a:t>
+            </a:r>
+            <a:r>
+              <a:rPr lang="en-US" b="0" i="0" dirty="0">
+                <a:solidFill>
+                  <a:srgbClr val="000000"/>
+                </a:solidFill>
+                <a:effectLst/>
+                <a:latin typeface="Droid Sans Mono"/>
+              </a:rPr>
+              <a:t> </a:t>
+            </a:r>
+            <a:br>
+              <a:rPr lang="en-US" b="0" i="0" dirty="0">
+                <a:solidFill>
+                  <a:srgbClr val="000000"/>
+                </a:solidFill>
+                <a:effectLst/>
+                <a:latin typeface="Droid Sans Mono"/>
+              </a:rPr>
+            </a:br>
+            <a:r>
+              <a:rPr lang="en-US" b="0" i="0" dirty="0">
+                <a:solidFill>
+                  <a:srgbClr val="666600"/>
+                </a:solidFill>
+                <a:effectLst/>
+                <a:latin typeface="Droid Sans Mono"/>
+              </a:rPr>
+              <a:t>}</a:t>
+            </a:r>
+            <a:endParaRPr lang="en-US" dirty="0"/>
+          </a:p>
+        </p:txBody>
+      </p:sp>
+      <p:pic>
+        <p:nvPicPr>
+          <p:cNvPr id="4" name="Picture 3">
+            <a:extLst>
+              <a:ext uri="{FF2B5EF4-FFF2-40B4-BE49-F238E27FC236}">
+                <a16:creationId xmlns:a16="http://schemas.microsoft.com/office/drawing/2014/main" id="{502C8389-AFD3-8FFB-91E0-26021F3EEC58}"/>
+              </a:ext>
+            </a:extLst>
+          </p:cNvPr>
+          <p:cNvPicPr>
+            <a:picLocks noChangeAspect="1"/>
+          </p:cNvPicPr>
+          <p:nvPr/>
+        </p:nvPicPr>
+        <p:blipFill>
+          <a:blip r:embed="rId4"/>
+          <a:stretch>
+            <a:fillRect/>
+          </a:stretch>
+        </p:blipFill>
+        <p:spPr>
+          <a:xfrm>
+            <a:off x="7179030" y="555594"/>
+            <a:ext cx="5012970" cy="2598154"/>
+          </a:xfrm>
+          <a:prstGeom prst="rect">
+            <a:avLst/>
+          </a:prstGeom>
+        </p:spPr>
+      </p:pic>
+      <p:sp>
+        <p:nvSpPr>
+          <p:cNvPr id="5" name="Oval 4">
+            <a:extLst>
+              <a:ext uri="{FF2B5EF4-FFF2-40B4-BE49-F238E27FC236}">
+                <a16:creationId xmlns:a16="http://schemas.microsoft.com/office/drawing/2014/main" id="{7A077143-DD66-550F-3E4E-0829DD793412}"/>
+              </a:ext>
+            </a:extLst>
+          </p:cNvPr>
+          <p:cNvSpPr/>
+          <p:nvPr/>
+        </p:nvSpPr>
+        <p:spPr>
+          <a:xfrm>
+            <a:off x="9042013" y="2528652"/>
+            <a:ext cx="242596" cy="242596"/>
+          </a:xfrm>
+          <a:prstGeom prst="ellipse">
+            <a:avLst/>
+          </a:prstGeom>
+          <a:solidFill>
+            <a:srgbClr val="FF0000"/>
+          </a:solidFill>
+        </p:spPr>
+        <p:style>
+          <a:lnRef idx="2">
+            <a:schemeClr val="accent1">
+              <a:shade val="15000"/>
+            </a:schemeClr>
+          </a:lnRef>
+          <a:fillRef idx="1">
+            <a:schemeClr val="accent1"/>
+          </a:fillRef>
+          <a:effectRef idx="0">
+            <a:schemeClr val="accent1"/>
+          </a:effectRef>
+          <a:fontRef idx="minor">
+            <a:schemeClr val="lt1"/>
+          </a:fontRef>
+        </p:style>
+        <p:txBody>
+          <a:bodyPr rtlCol="0" anchor="ctr"/>
+          <a:lstStyle/>
+          <a:p>
+            <a:pPr algn="ctr"/>
+            <a:endParaRPr lang="en-US"/>
+          </a:p>
+        </p:txBody>
+      </p:sp>
+    </p:spTree>
+    <p:extLst>
+      <p:ext uri="{BB962C8B-B14F-4D97-AF65-F5344CB8AC3E}">
+        <p14:creationId xmlns:p14="http://schemas.microsoft.com/office/powerpoint/2010/main" val="48223207"/>
+      </p:ext>
+    </p:extLst>
+  </p:cSld>
+  <p:clrMapOvr>
+    <a:masterClrMapping/>
+  </p:clrMapOvr>
+</p:sld>
+</file>
+
+<file path=ppt/slides/slide48.xml><?xml version="1.0" encoding="utf-8"?>
+<p:sld xmlns:a="http://schemas.openxmlformats.org/drawingml/2006/main" xmlns:r="http://schemas.openxmlformats.org/officeDocument/2006/relationships" xmlns:p="http://schemas.openxmlformats.org/presentationml/2006/main">
+  <p:cSld>
+    <p:spTree>
+      <p:nvGrpSpPr>
+        <p:cNvPr id="1" name=""/>
+        <p:cNvGrpSpPr/>
+        <p:nvPr/>
+      </p:nvGrpSpPr>
+      <p:grpSpPr>
+        <a:xfrm>
+          <a:off x="0" y="0"/>
+          <a:ext cx="0" cy="0"/>
+          <a:chOff x="0" y="0"/>
+          <a:chExt cx="0" cy="0"/>
+        </a:xfrm>
+      </p:grpSpPr>
+      <p:sp>
+        <p:nvSpPr>
+          <p:cNvPr id="2" name="Title 1">
+            <a:extLst>
+              <a:ext uri="{FF2B5EF4-FFF2-40B4-BE49-F238E27FC236}">
+                <a16:creationId xmlns:a16="http://schemas.microsoft.com/office/drawing/2014/main" id="{0F3F56CA-C931-67D7-6382-29F1CF339A1F}"/>
+              </a:ext>
+            </a:extLst>
+          </p:cNvPr>
+          <p:cNvSpPr>
+            <a:spLocks noGrp="1"/>
+          </p:cNvSpPr>
+          <p:nvPr>
+            <p:ph type="title"/>
+          </p:nvPr>
+        </p:nvSpPr>
+        <p:spPr/>
+        <p:txBody>
+          <a:bodyPr/>
+          <a:lstStyle/>
+          <a:p>
+            <a:r>
+              <a:rPr lang="en-US" dirty="0" err="1"/>
+              <a:t>NgRX</a:t>
+            </a:r>
+            <a:r>
+              <a:rPr lang="en-US" dirty="0"/>
+              <a:t> - Reducers</a:t>
+            </a:r>
+          </a:p>
+        </p:txBody>
+      </p:sp>
+      <p:sp>
+        <p:nvSpPr>
+          <p:cNvPr id="3" name="Content Placeholder 2">
+            <a:extLst>
+              <a:ext uri="{FF2B5EF4-FFF2-40B4-BE49-F238E27FC236}">
+                <a16:creationId xmlns:a16="http://schemas.microsoft.com/office/drawing/2014/main" id="{87EF7DBD-DD82-42F4-40A7-8516331285B8}"/>
+              </a:ext>
+            </a:extLst>
+          </p:cNvPr>
+          <p:cNvSpPr>
+            <a:spLocks noGrp="1"/>
+          </p:cNvSpPr>
+          <p:nvPr>
+            <p:ph idx="1"/>
+          </p:nvPr>
+        </p:nvSpPr>
+        <p:spPr/>
+        <p:txBody>
+          <a:bodyPr>
+            <a:normAutofit/>
+          </a:bodyPr>
+          <a:lstStyle/>
+          <a:p>
+            <a:r>
+              <a:rPr lang="en-US" dirty="0"/>
+              <a:t>Reducers in </a:t>
+            </a:r>
+            <a:r>
+              <a:rPr lang="en-US" dirty="0" err="1"/>
+              <a:t>NgRx</a:t>
+            </a:r>
+            <a:r>
+              <a:rPr lang="en-US" dirty="0"/>
+              <a:t> are responsible for </a:t>
+            </a:r>
+            <a:br>
+              <a:rPr lang="en-US" dirty="0"/>
+            </a:br>
+            <a:r>
+              <a:rPr lang="en-US" dirty="0"/>
+              <a:t>handling transitions from one state to </a:t>
+            </a:r>
+            <a:br>
+              <a:rPr lang="en-US" dirty="0"/>
+            </a:br>
+            <a:r>
+              <a:rPr lang="en-US" dirty="0"/>
+              <a:t>the next state in your application</a:t>
+            </a:r>
+          </a:p>
+          <a:p>
+            <a:r>
+              <a:rPr lang="en-US" dirty="0"/>
+              <a:t>Reducer functions handle these </a:t>
+            </a:r>
+            <a:br>
+              <a:rPr lang="en-US" dirty="0"/>
+            </a:br>
+            <a:r>
+              <a:rPr lang="en-US" dirty="0"/>
+              <a:t>transitions by determining which actions to handle based on the action's type</a:t>
+            </a:r>
+          </a:p>
+          <a:p>
+            <a:r>
+              <a:rPr lang="en-US" dirty="0"/>
+              <a:t>Reducers handle each state transition synchronously</a:t>
+            </a:r>
+          </a:p>
+          <a:p>
+            <a:r>
+              <a:rPr lang="en-US" dirty="0"/>
+              <a:t>Each reducer function takes the latest Action dispatched, the current state, and determines whether to return a newly modified state or the original state</a:t>
+            </a:r>
+          </a:p>
+        </p:txBody>
+      </p:sp>
+      <p:pic>
+        <p:nvPicPr>
+          <p:cNvPr id="4" name="Picture 3">
+            <a:extLst>
+              <a:ext uri="{FF2B5EF4-FFF2-40B4-BE49-F238E27FC236}">
+                <a16:creationId xmlns:a16="http://schemas.microsoft.com/office/drawing/2014/main" id="{502C8389-AFD3-8FFB-91E0-26021F3EEC58}"/>
+              </a:ext>
+            </a:extLst>
+          </p:cNvPr>
+          <p:cNvPicPr>
+            <a:picLocks noChangeAspect="1"/>
+          </p:cNvPicPr>
+          <p:nvPr/>
+        </p:nvPicPr>
+        <p:blipFill>
+          <a:blip r:embed="rId2"/>
+          <a:stretch>
+            <a:fillRect/>
+          </a:stretch>
+        </p:blipFill>
+        <p:spPr>
+          <a:xfrm>
+            <a:off x="7179030" y="555594"/>
+            <a:ext cx="5012970" cy="2598154"/>
+          </a:xfrm>
+          <a:prstGeom prst="rect">
+            <a:avLst/>
+          </a:prstGeom>
+        </p:spPr>
+      </p:pic>
+      <p:sp>
+        <p:nvSpPr>
+          <p:cNvPr id="5" name="Oval 4">
+            <a:extLst>
+              <a:ext uri="{FF2B5EF4-FFF2-40B4-BE49-F238E27FC236}">
+                <a16:creationId xmlns:a16="http://schemas.microsoft.com/office/drawing/2014/main" id="{7A077143-DD66-550F-3E4E-0829DD793412}"/>
+              </a:ext>
+            </a:extLst>
+          </p:cNvPr>
+          <p:cNvSpPr/>
+          <p:nvPr/>
+        </p:nvSpPr>
+        <p:spPr>
+          <a:xfrm>
+            <a:off x="9990597" y="1690688"/>
+            <a:ext cx="242596" cy="242596"/>
+          </a:xfrm>
+          <a:prstGeom prst="ellipse">
+            <a:avLst/>
+          </a:prstGeom>
+          <a:solidFill>
+            <a:srgbClr val="FF0000"/>
+          </a:solidFill>
+        </p:spPr>
+        <p:style>
+          <a:lnRef idx="2">
+            <a:schemeClr val="accent1">
+              <a:shade val="15000"/>
+            </a:schemeClr>
+          </a:lnRef>
+          <a:fillRef idx="1">
+            <a:schemeClr val="accent1"/>
+          </a:fillRef>
+          <a:effectRef idx="0">
+            <a:schemeClr val="accent1"/>
+          </a:effectRef>
+          <a:fontRef idx="minor">
+            <a:schemeClr val="lt1"/>
+          </a:fontRef>
+        </p:style>
+        <p:txBody>
+          <a:bodyPr rtlCol="0" anchor="ctr"/>
+          <a:lstStyle/>
+          <a:p>
+            <a:pPr algn="ctr"/>
+            <a:endParaRPr lang="en-US"/>
+          </a:p>
+        </p:txBody>
+      </p:sp>
+    </p:spTree>
+    <p:extLst>
+      <p:ext uri="{BB962C8B-B14F-4D97-AF65-F5344CB8AC3E}">
+        <p14:creationId xmlns:p14="http://schemas.microsoft.com/office/powerpoint/2010/main" val="1463039658"/>
+      </p:ext>
+    </p:extLst>
+  </p:cSld>
+  <p:clrMapOvr>
+    <a:masterClrMapping/>
+  </p:clrMapOvr>
+</p:sld>
+</file>
+
+<file path=ppt/slides/slide49.xml><?xml version="1.0" encoding="utf-8"?>
+<p:sld xmlns:a="http://schemas.openxmlformats.org/drawingml/2006/main" xmlns:r="http://schemas.openxmlformats.org/officeDocument/2006/relationships" xmlns:p="http://schemas.openxmlformats.org/presentationml/2006/main">
+  <p:cSld>
+    <p:spTree>
+      <p:nvGrpSpPr>
+        <p:cNvPr id="1" name=""/>
+        <p:cNvGrpSpPr/>
+        <p:nvPr/>
+      </p:nvGrpSpPr>
+      <p:grpSpPr>
+        <a:xfrm>
+          <a:off x="0" y="0"/>
+          <a:ext cx="0" cy="0"/>
+          <a:chOff x="0" y="0"/>
+          <a:chExt cx="0" cy="0"/>
+        </a:xfrm>
+      </p:grpSpPr>
+      <p:sp>
+        <p:nvSpPr>
+          <p:cNvPr id="2" name="Title 1">
+            <a:extLst>
+              <a:ext uri="{FF2B5EF4-FFF2-40B4-BE49-F238E27FC236}">
+                <a16:creationId xmlns:a16="http://schemas.microsoft.com/office/drawing/2014/main" id="{0F3F56CA-C931-67D7-6382-29F1CF339A1F}"/>
+              </a:ext>
+            </a:extLst>
+          </p:cNvPr>
+          <p:cNvSpPr>
+            <a:spLocks noGrp="1"/>
+          </p:cNvSpPr>
+          <p:nvPr>
+            <p:ph type="title"/>
+          </p:nvPr>
+        </p:nvSpPr>
+        <p:spPr/>
+        <p:txBody>
+          <a:bodyPr/>
+          <a:lstStyle/>
+          <a:p>
+            <a:r>
+              <a:rPr lang="en-US" dirty="0" err="1"/>
+              <a:t>NgRX</a:t>
+            </a:r>
+            <a:r>
+              <a:rPr lang="en-US" dirty="0"/>
+              <a:t> - Effects</a:t>
+            </a:r>
+          </a:p>
+        </p:txBody>
+      </p:sp>
+      <p:sp>
+        <p:nvSpPr>
+          <p:cNvPr id="3" name="Content Placeholder 2">
+            <a:extLst>
+              <a:ext uri="{FF2B5EF4-FFF2-40B4-BE49-F238E27FC236}">
+                <a16:creationId xmlns:a16="http://schemas.microsoft.com/office/drawing/2014/main" id="{87EF7DBD-DD82-42F4-40A7-8516331285B8}"/>
+              </a:ext>
+            </a:extLst>
+          </p:cNvPr>
+          <p:cNvSpPr>
+            <a:spLocks noGrp="1"/>
+          </p:cNvSpPr>
+          <p:nvPr>
+            <p:ph idx="1"/>
+          </p:nvPr>
+        </p:nvSpPr>
+        <p:spPr/>
+        <p:txBody>
+          <a:bodyPr>
+            <a:normAutofit fontScale="92500" lnSpcReduction="20000"/>
+          </a:bodyPr>
+          <a:lstStyle/>
+          <a:p>
+            <a:r>
+              <a:rPr lang="en-US" dirty="0"/>
+              <a:t>Effects use streams to provide new </a:t>
+            </a:r>
+            <a:br>
+              <a:rPr lang="en-US" dirty="0"/>
+            </a:br>
+            <a:r>
+              <a:rPr lang="en-US" dirty="0"/>
+              <a:t>sources of actions to reduce state </a:t>
+            </a:r>
+            <a:br>
+              <a:rPr lang="en-US" dirty="0"/>
+            </a:br>
+            <a:r>
+              <a:rPr lang="en-US" dirty="0"/>
+              <a:t>based on external interactions</a:t>
+            </a:r>
+          </a:p>
+          <a:p>
+            <a:r>
+              <a:rPr lang="en-US" dirty="0"/>
+              <a:t>Effects provide a way to interact with </a:t>
+            </a:r>
+            <a:br>
+              <a:rPr lang="en-US" dirty="0"/>
+            </a:br>
+            <a:r>
+              <a:rPr lang="en-US" dirty="0"/>
+              <a:t>services and isolate them from the components</a:t>
+            </a:r>
+          </a:p>
+          <a:p>
+            <a:r>
+              <a:rPr lang="en-US" dirty="0"/>
+              <a:t>Effects isolate side effects from components, allowing for more pure components that select state and dispatch actions.</a:t>
+            </a:r>
+          </a:p>
+          <a:p>
+            <a:r>
+              <a:rPr lang="en-US" dirty="0"/>
+              <a:t>Effects are long-running services that listen to an observable of every action dispatched from the Store.</a:t>
+            </a:r>
+          </a:p>
+          <a:p>
+            <a:r>
+              <a:rPr lang="en-US" dirty="0"/>
+              <a:t>Effects filter those actions based on the type of action they are interested in. </a:t>
+            </a:r>
+          </a:p>
+          <a:p>
+            <a:r>
+              <a:rPr lang="en-US" dirty="0"/>
+              <a:t>Effects perform tasks, which are synchronous or asynchronous and return a new action.</a:t>
+            </a:r>
+          </a:p>
+        </p:txBody>
+      </p:sp>
+      <p:pic>
+        <p:nvPicPr>
+          <p:cNvPr id="4" name="Picture 3">
+            <a:extLst>
+              <a:ext uri="{FF2B5EF4-FFF2-40B4-BE49-F238E27FC236}">
+                <a16:creationId xmlns:a16="http://schemas.microsoft.com/office/drawing/2014/main" id="{502C8389-AFD3-8FFB-91E0-26021F3EEC58}"/>
+              </a:ext>
+            </a:extLst>
+          </p:cNvPr>
+          <p:cNvPicPr>
+            <a:picLocks noChangeAspect="1"/>
+          </p:cNvPicPr>
+          <p:nvPr/>
+        </p:nvPicPr>
+        <p:blipFill>
+          <a:blip r:embed="rId2"/>
+          <a:stretch>
+            <a:fillRect/>
+          </a:stretch>
+        </p:blipFill>
+        <p:spPr>
+          <a:xfrm>
+            <a:off x="7179030" y="555594"/>
+            <a:ext cx="5012970" cy="2598154"/>
+          </a:xfrm>
+          <a:prstGeom prst="rect">
+            <a:avLst/>
+          </a:prstGeom>
+        </p:spPr>
+      </p:pic>
+      <p:sp>
+        <p:nvSpPr>
+          <p:cNvPr id="5" name="Oval 4">
+            <a:extLst>
+              <a:ext uri="{FF2B5EF4-FFF2-40B4-BE49-F238E27FC236}">
+                <a16:creationId xmlns:a16="http://schemas.microsoft.com/office/drawing/2014/main" id="{7A077143-DD66-550F-3E4E-0829DD793412}"/>
+              </a:ext>
+            </a:extLst>
+          </p:cNvPr>
+          <p:cNvSpPr/>
+          <p:nvPr/>
+        </p:nvSpPr>
+        <p:spPr>
+          <a:xfrm>
+            <a:off x="9990597" y="1690688"/>
+            <a:ext cx="242596" cy="242596"/>
+          </a:xfrm>
+          <a:prstGeom prst="ellipse">
+            <a:avLst/>
+          </a:prstGeom>
+          <a:solidFill>
+            <a:srgbClr val="FF0000"/>
+          </a:solidFill>
+        </p:spPr>
+        <p:style>
+          <a:lnRef idx="2">
+            <a:schemeClr val="accent1">
+              <a:shade val="15000"/>
+            </a:schemeClr>
+          </a:lnRef>
+          <a:fillRef idx="1">
+            <a:schemeClr val="accent1"/>
+          </a:fillRef>
+          <a:effectRef idx="0">
+            <a:schemeClr val="accent1"/>
+          </a:effectRef>
+          <a:fontRef idx="minor">
+            <a:schemeClr val="lt1"/>
+          </a:fontRef>
+        </p:style>
+        <p:txBody>
+          <a:bodyPr rtlCol="0" anchor="ctr"/>
+          <a:lstStyle/>
+          <a:p>
+            <a:pPr algn="ctr"/>
+            <a:endParaRPr lang="en-US"/>
+          </a:p>
+        </p:txBody>
+      </p:sp>
+    </p:spTree>
+    <p:extLst>
+      <p:ext uri="{BB962C8B-B14F-4D97-AF65-F5344CB8AC3E}">
+        <p14:creationId xmlns:p14="http://schemas.microsoft.com/office/powerpoint/2010/main" val="906825442"/>
+      </p:ext>
+    </p:extLst>
+  </p:cSld>
+  <p:clrMapOvr>
+    <a:masterClrMapping/>
+  </p:clrMapOvr>
+</p:sld>
+</file>
+
 <file path=ppt/slides/slide5.xml><?xml version="1.0" encoding="utf-8"?>
 <p:sld xmlns:a="http://schemas.openxmlformats.org/drawingml/2006/main" xmlns:r="http://schemas.openxmlformats.org/officeDocument/2006/relationships" xmlns:p="http://schemas.openxmlformats.org/presentationml/2006/main">
   <p:cSld>
@@ -13517,6 +15519,1107 @@
     <p:extLst>
       <p:ext uri="{BB962C8B-B14F-4D97-AF65-F5344CB8AC3E}">
         <p14:creationId xmlns:p14="http://schemas.microsoft.com/office/powerpoint/2010/main" val="1955484564"/>
+      </p:ext>
+    </p:extLst>
+  </p:cSld>
+  <p:clrMapOvr>
+    <a:masterClrMapping/>
+  </p:clrMapOvr>
+</p:sld>
+</file>
+
+<file path=ppt/slides/slide50.xml><?xml version="1.0" encoding="utf-8"?>
+<p:sld xmlns:a="http://schemas.openxmlformats.org/drawingml/2006/main" xmlns:r="http://schemas.openxmlformats.org/officeDocument/2006/relationships" xmlns:p="http://schemas.openxmlformats.org/presentationml/2006/main">
+  <p:cSld>
+    <p:spTree>
+      <p:nvGrpSpPr>
+        <p:cNvPr id="1" name=""/>
+        <p:cNvGrpSpPr/>
+        <p:nvPr/>
+      </p:nvGrpSpPr>
+      <p:grpSpPr>
+        <a:xfrm>
+          <a:off x="0" y="0"/>
+          <a:ext cx="0" cy="0"/>
+          <a:chOff x="0" y="0"/>
+          <a:chExt cx="0" cy="0"/>
+        </a:xfrm>
+      </p:grpSpPr>
+      <p:sp>
+        <p:nvSpPr>
+          <p:cNvPr id="2" name="Title 1">
+            <a:extLst>
+              <a:ext uri="{FF2B5EF4-FFF2-40B4-BE49-F238E27FC236}">
+                <a16:creationId xmlns:a16="http://schemas.microsoft.com/office/drawing/2014/main" id="{0F3F56CA-C931-67D7-6382-29F1CF339A1F}"/>
+              </a:ext>
+            </a:extLst>
+          </p:cNvPr>
+          <p:cNvSpPr>
+            <a:spLocks noGrp="1"/>
+          </p:cNvSpPr>
+          <p:nvPr>
+            <p:ph type="title"/>
+          </p:nvPr>
+        </p:nvSpPr>
+        <p:spPr/>
+        <p:txBody>
+          <a:bodyPr/>
+          <a:lstStyle/>
+          <a:p>
+            <a:r>
+              <a:rPr lang="en-US" dirty="0" err="1"/>
+              <a:t>NgRX</a:t>
+            </a:r>
+            <a:r>
+              <a:rPr lang="en-US" dirty="0"/>
+              <a:t> – A dummy example!</a:t>
+            </a:r>
+          </a:p>
+        </p:txBody>
+      </p:sp>
+      <p:sp>
+        <p:nvSpPr>
+          <p:cNvPr id="3" name="Content Placeholder 2">
+            <a:extLst>
+              <a:ext uri="{FF2B5EF4-FFF2-40B4-BE49-F238E27FC236}">
+                <a16:creationId xmlns:a16="http://schemas.microsoft.com/office/drawing/2014/main" id="{87EF7DBD-DD82-42F4-40A7-8516331285B8}"/>
+              </a:ext>
+            </a:extLst>
+          </p:cNvPr>
+          <p:cNvSpPr>
+            <a:spLocks noGrp="1"/>
+          </p:cNvSpPr>
+          <p:nvPr>
+            <p:ph idx="1"/>
+          </p:nvPr>
+        </p:nvSpPr>
+        <p:spPr/>
+        <p:txBody>
+          <a:bodyPr>
+            <a:normAutofit/>
+          </a:bodyPr>
+          <a:lstStyle/>
+          <a:p>
+            <a:pPr marL="0" indent="0">
+              <a:buNone/>
+            </a:pPr>
+            <a:r>
+              <a:rPr lang="en-US" dirty="0"/>
+              <a:t>Requirement:</a:t>
+            </a:r>
+          </a:p>
+          <a:p>
+            <a:r>
+              <a:rPr lang="en-US" dirty="0"/>
+              <a:t>Component request data</a:t>
+            </a:r>
+          </a:p>
+          <a:p>
+            <a:r>
+              <a:rPr lang="en-US" dirty="0"/>
+              <a:t>Component shows a spinner while “Loading” </a:t>
+            </a:r>
+          </a:p>
+          <a:p>
+            <a:r>
+              <a:rPr lang="en-US" dirty="0"/>
+              <a:t>External service provide response (Success or Fail)</a:t>
+            </a:r>
+          </a:p>
+          <a:p>
+            <a:r>
+              <a:rPr lang="en-US" dirty="0"/>
+              <a:t>Component react accordingly:</a:t>
+            </a:r>
+          </a:p>
+          <a:p>
+            <a:pPr lvl="1"/>
+            <a:r>
+              <a:rPr lang="en-US" dirty="0"/>
+              <a:t>If success: “Data” is shown</a:t>
+            </a:r>
+          </a:p>
+          <a:p>
+            <a:pPr lvl="1"/>
+            <a:r>
+              <a:rPr lang="en-US" dirty="0"/>
+              <a:t>If fails: “Error” is shown</a:t>
+            </a:r>
+          </a:p>
+          <a:p>
+            <a:pPr lvl="1"/>
+            <a:endParaRPr lang="en-US" dirty="0"/>
+          </a:p>
+          <a:p>
+            <a:pPr lvl="1"/>
+            <a:endParaRPr lang="en-US" dirty="0"/>
+          </a:p>
+          <a:p>
+            <a:endParaRPr lang="en-US" dirty="0"/>
+          </a:p>
+        </p:txBody>
+      </p:sp>
+    </p:spTree>
+    <p:extLst>
+      <p:ext uri="{BB962C8B-B14F-4D97-AF65-F5344CB8AC3E}">
+        <p14:creationId xmlns:p14="http://schemas.microsoft.com/office/powerpoint/2010/main" val="3876710053"/>
+      </p:ext>
+    </p:extLst>
+  </p:cSld>
+  <p:clrMapOvr>
+    <a:masterClrMapping/>
+  </p:clrMapOvr>
+</p:sld>
+</file>
+
+<file path=ppt/slides/slide51.xml><?xml version="1.0" encoding="utf-8"?>
+<p:sld xmlns:a="http://schemas.openxmlformats.org/drawingml/2006/main" xmlns:r="http://schemas.openxmlformats.org/officeDocument/2006/relationships" xmlns:p="http://schemas.openxmlformats.org/presentationml/2006/main">
+  <p:cSld>
+    <p:spTree>
+      <p:nvGrpSpPr>
+        <p:cNvPr id="1" name=""/>
+        <p:cNvGrpSpPr/>
+        <p:nvPr/>
+      </p:nvGrpSpPr>
+      <p:grpSpPr>
+        <a:xfrm>
+          <a:off x="0" y="0"/>
+          <a:ext cx="0" cy="0"/>
+          <a:chOff x="0" y="0"/>
+          <a:chExt cx="0" cy="0"/>
+        </a:xfrm>
+      </p:grpSpPr>
+      <p:sp>
+        <p:nvSpPr>
+          <p:cNvPr id="2" name="Title 1">
+            <a:extLst>
+              <a:ext uri="{FF2B5EF4-FFF2-40B4-BE49-F238E27FC236}">
+                <a16:creationId xmlns:a16="http://schemas.microsoft.com/office/drawing/2014/main" id="{0F3F56CA-C931-67D7-6382-29F1CF339A1F}"/>
+              </a:ext>
+            </a:extLst>
+          </p:cNvPr>
+          <p:cNvSpPr>
+            <a:spLocks noGrp="1"/>
+          </p:cNvSpPr>
+          <p:nvPr>
+            <p:ph type="title"/>
+          </p:nvPr>
+        </p:nvSpPr>
+        <p:spPr/>
+        <p:txBody>
+          <a:bodyPr/>
+          <a:lstStyle/>
+          <a:p>
+            <a:r>
+              <a:rPr lang="en-US" dirty="0" err="1"/>
+              <a:t>NgRX</a:t>
+            </a:r>
+            <a:r>
+              <a:rPr lang="en-US" dirty="0"/>
+              <a:t> – A dummy example!</a:t>
+            </a:r>
+          </a:p>
+        </p:txBody>
+      </p:sp>
+      <p:sp>
+        <p:nvSpPr>
+          <p:cNvPr id="3" name="Content Placeholder 2">
+            <a:extLst>
+              <a:ext uri="{FF2B5EF4-FFF2-40B4-BE49-F238E27FC236}">
+                <a16:creationId xmlns:a16="http://schemas.microsoft.com/office/drawing/2014/main" id="{87EF7DBD-DD82-42F4-40A7-8516331285B8}"/>
+              </a:ext>
+            </a:extLst>
+          </p:cNvPr>
+          <p:cNvSpPr>
+            <a:spLocks noGrp="1"/>
+          </p:cNvSpPr>
+          <p:nvPr>
+            <p:ph idx="1"/>
+          </p:nvPr>
+        </p:nvSpPr>
+        <p:spPr>
+          <a:xfrm>
+            <a:off x="838200" y="1834171"/>
+            <a:ext cx="10515600" cy="4351338"/>
+          </a:xfrm>
+        </p:spPr>
+        <p:txBody>
+          <a:bodyPr>
+            <a:normAutofit fontScale="70000" lnSpcReduction="20000"/>
+          </a:bodyPr>
+          <a:lstStyle/>
+          <a:p>
+            <a:pPr marL="0" indent="0">
+              <a:buNone/>
+            </a:pPr>
+            <a:r>
+              <a:rPr lang="en-US" dirty="0"/>
+              <a:t>Sequence of events:</a:t>
+            </a:r>
+          </a:p>
+          <a:p>
+            <a:pPr marL="0" indent="0">
+              <a:buNone/>
+            </a:pPr>
+            <a:r>
+              <a:rPr lang="en-US" dirty="0"/>
+              <a:t>1. Component request data via </a:t>
+            </a:r>
+            <a:r>
+              <a:rPr lang="en-US" b="1" u="sng" dirty="0"/>
+              <a:t>Action</a:t>
+            </a:r>
+          </a:p>
+          <a:p>
+            <a:pPr marL="0" indent="0">
+              <a:buNone/>
+            </a:pPr>
+            <a:r>
+              <a:rPr lang="en-US" dirty="0"/>
+              <a:t>2. </a:t>
+            </a:r>
+            <a:r>
+              <a:rPr lang="en-US" b="1" u="sng" dirty="0"/>
+              <a:t>Reducer</a:t>
+            </a:r>
+            <a:r>
+              <a:rPr lang="en-US" dirty="0"/>
+              <a:t> handles </a:t>
+            </a:r>
+            <a:r>
+              <a:rPr lang="en-US" b="1" u="sng" dirty="0"/>
+              <a:t>Action</a:t>
+            </a:r>
+            <a:r>
+              <a:rPr lang="en-US" dirty="0"/>
+              <a:t> to modify </a:t>
+            </a:r>
+            <a:r>
+              <a:rPr lang="en-US" b="1" u="sng" dirty="0"/>
+              <a:t>Store</a:t>
+            </a:r>
+            <a:r>
+              <a:rPr lang="en-US" dirty="0"/>
+              <a:t> with the following:</a:t>
+            </a:r>
+          </a:p>
+          <a:p>
+            <a:pPr marL="457200" lvl="1" indent="0">
+              <a:buNone/>
+            </a:pPr>
+            <a:r>
+              <a:rPr lang="en-US" dirty="0"/>
+              <a:t>“Error” is clear, new request is handled</a:t>
+            </a:r>
+          </a:p>
+          <a:p>
+            <a:pPr marL="457200" lvl="1" indent="0">
+              <a:buNone/>
+            </a:pPr>
+            <a:r>
+              <a:rPr lang="en-US" dirty="0"/>
+              <a:t>“Loading” is set TRUE to show status</a:t>
+            </a:r>
+          </a:p>
+          <a:p>
+            <a:pPr marL="457200" lvl="1" indent="0">
+              <a:buNone/>
+            </a:pPr>
+            <a:r>
+              <a:rPr lang="en-US" dirty="0"/>
+              <a:t>“Data” is clear to request new</a:t>
+            </a:r>
+          </a:p>
+          <a:p>
+            <a:pPr marL="0" indent="0">
+              <a:buNone/>
+            </a:pPr>
+            <a:r>
+              <a:rPr lang="en-US" dirty="0"/>
+              <a:t>3. Component receives updates via “Loading” </a:t>
+            </a:r>
+            <a:r>
+              <a:rPr lang="en-US" b="1" u="sng" dirty="0"/>
+              <a:t>Selector</a:t>
+            </a:r>
+            <a:endParaRPr lang="en-US" dirty="0"/>
+          </a:p>
+          <a:p>
+            <a:pPr marL="0" indent="0">
+              <a:buNone/>
+            </a:pPr>
+            <a:r>
+              <a:rPr lang="en-US" dirty="0"/>
+              <a:t>2.1 </a:t>
+            </a:r>
+            <a:r>
+              <a:rPr lang="en-US" b="1" u="sng" dirty="0"/>
+              <a:t>Effect</a:t>
+            </a:r>
+            <a:r>
+              <a:rPr lang="en-US" dirty="0"/>
+              <a:t> intercepts action and execute data fetch process</a:t>
+            </a:r>
+          </a:p>
+          <a:p>
+            <a:pPr marL="0" indent="0">
+              <a:buNone/>
+            </a:pPr>
+            <a:r>
+              <a:rPr lang="en-US" dirty="0"/>
+              <a:t>2.2 External service responses data</a:t>
+            </a:r>
+          </a:p>
+          <a:p>
+            <a:pPr marL="0" indent="0">
+              <a:buNone/>
+            </a:pPr>
+            <a:r>
+              <a:rPr lang="en-US" dirty="0"/>
+              <a:t>2.3 </a:t>
+            </a:r>
+            <a:r>
+              <a:rPr lang="en-US" b="1" u="sng" dirty="0"/>
+              <a:t>Effect</a:t>
+            </a:r>
+            <a:r>
+              <a:rPr lang="en-US" dirty="0"/>
+              <a:t> completes process and execute new success or fail </a:t>
+            </a:r>
+            <a:r>
+              <a:rPr lang="en-US" b="1" u="sng" dirty="0"/>
+              <a:t>Action</a:t>
+            </a:r>
+          </a:p>
+          <a:p>
+            <a:pPr marL="0" indent="0">
+              <a:buNone/>
+            </a:pPr>
+            <a:r>
+              <a:rPr lang="en-US" dirty="0"/>
+              <a:t>4. </a:t>
+            </a:r>
+            <a:r>
+              <a:rPr lang="en-US" b="1" u="sng" dirty="0"/>
+              <a:t>Reducer</a:t>
+            </a:r>
+            <a:r>
+              <a:rPr lang="en-US" dirty="0"/>
+              <a:t> handles </a:t>
+            </a:r>
+            <a:r>
+              <a:rPr lang="en-US" b="1" u="sng" dirty="0"/>
+              <a:t>Action</a:t>
+            </a:r>
+            <a:r>
+              <a:rPr lang="en-US" dirty="0"/>
+              <a:t> to modify </a:t>
+            </a:r>
+            <a:r>
+              <a:rPr lang="en-US" b="1" u="sng" dirty="0"/>
+              <a:t>Store</a:t>
+            </a:r>
+            <a:r>
+              <a:rPr lang="en-US" dirty="0"/>
+              <a:t> to do the following:</a:t>
+            </a:r>
+          </a:p>
+          <a:p>
+            <a:pPr marL="457200" lvl="1" indent="0">
+              <a:buNone/>
+            </a:pPr>
+            <a:r>
+              <a:rPr lang="en-US" dirty="0"/>
+              <a:t>If “Success”: “Error” is omitted, “Loading” is set FALSE, “Data” is set</a:t>
+            </a:r>
+          </a:p>
+          <a:p>
+            <a:pPr marL="457200" lvl="1" indent="0">
+              <a:buNone/>
+            </a:pPr>
+            <a:r>
+              <a:rPr lang="en-US" dirty="0"/>
+              <a:t>If “Fails”: “Error” is set, “Loading” is set FALSE, “Data” is NOT set</a:t>
+            </a:r>
+          </a:p>
+          <a:p>
+            <a:pPr marL="0" indent="0">
+              <a:buNone/>
+            </a:pPr>
+            <a:r>
+              <a:rPr lang="en-US" dirty="0"/>
+              <a:t>5. Component receives the updates via </a:t>
+            </a:r>
+            <a:r>
+              <a:rPr lang="en-US" b="1" u="sng" dirty="0"/>
+              <a:t>Selectors</a:t>
+            </a:r>
+            <a:endParaRPr lang="en-US" dirty="0"/>
+          </a:p>
+          <a:p>
+            <a:endParaRPr lang="en-US" dirty="0"/>
+          </a:p>
+        </p:txBody>
+      </p:sp>
+    </p:spTree>
+    <p:extLst>
+      <p:ext uri="{BB962C8B-B14F-4D97-AF65-F5344CB8AC3E}">
+        <p14:creationId xmlns:p14="http://schemas.microsoft.com/office/powerpoint/2010/main" val="1286035546"/>
+      </p:ext>
+    </p:extLst>
+  </p:cSld>
+  <p:clrMapOvr>
+    <a:masterClrMapping/>
+  </p:clrMapOvr>
+</p:sld>
+</file>
+
+<file path=ppt/slides/slide52.xml><?xml version="1.0" encoding="utf-8"?>
+<p:sld xmlns:a="http://schemas.openxmlformats.org/drawingml/2006/main" xmlns:r="http://schemas.openxmlformats.org/officeDocument/2006/relationships" xmlns:p="http://schemas.openxmlformats.org/presentationml/2006/main">
+  <p:cSld>
+    <p:spTree>
+      <p:nvGrpSpPr>
+        <p:cNvPr id="1" name=""/>
+        <p:cNvGrpSpPr/>
+        <p:nvPr/>
+      </p:nvGrpSpPr>
+      <p:grpSpPr>
+        <a:xfrm>
+          <a:off x="0" y="0"/>
+          <a:ext cx="0" cy="0"/>
+          <a:chOff x="0" y="0"/>
+          <a:chExt cx="0" cy="0"/>
+        </a:xfrm>
+      </p:grpSpPr>
+      <p:sp>
+        <p:nvSpPr>
+          <p:cNvPr id="2" name="Title 1">
+            <a:extLst>
+              <a:ext uri="{FF2B5EF4-FFF2-40B4-BE49-F238E27FC236}">
+                <a16:creationId xmlns:a16="http://schemas.microsoft.com/office/drawing/2014/main" id="{0F3F56CA-C931-67D7-6382-29F1CF339A1F}"/>
+              </a:ext>
+            </a:extLst>
+          </p:cNvPr>
+          <p:cNvSpPr>
+            <a:spLocks noGrp="1"/>
+          </p:cNvSpPr>
+          <p:nvPr>
+            <p:ph type="title"/>
+          </p:nvPr>
+        </p:nvSpPr>
+        <p:spPr/>
+        <p:txBody>
+          <a:bodyPr/>
+          <a:lstStyle/>
+          <a:p>
+            <a:r>
+              <a:rPr lang="en-US" dirty="0" err="1"/>
+              <a:t>NgRX</a:t>
+            </a:r>
+            <a:r>
+              <a:rPr lang="en-US" dirty="0"/>
+              <a:t> – A dummy example!</a:t>
+            </a:r>
+          </a:p>
+        </p:txBody>
+      </p:sp>
+      <p:pic>
+        <p:nvPicPr>
+          <p:cNvPr id="6" name="Picture 5">
+            <a:extLst>
+              <a:ext uri="{FF2B5EF4-FFF2-40B4-BE49-F238E27FC236}">
+                <a16:creationId xmlns:a16="http://schemas.microsoft.com/office/drawing/2014/main" id="{ADB9CEFB-5646-B876-C472-E0D12003E527}"/>
+              </a:ext>
+            </a:extLst>
+          </p:cNvPr>
+          <p:cNvPicPr>
+            <a:picLocks noChangeAspect="1"/>
+          </p:cNvPicPr>
+          <p:nvPr/>
+        </p:nvPicPr>
+        <p:blipFill>
+          <a:blip r:embed="rId2"/>
+          <a:stretch>
+            <a:fillRect/>
+          </a:stretch>
+        </p:blipFill>
+        <p:spPr>
+          <a:xfrm>
+            <a:off x="1275281" y="1576874"/>
+            <a:ext cx="9641437" cy="4989443"/>
+          </a:xfrm>
+          <a:prstGeom prst="rect">
+            <a:avLst/>
+          </a:prstGeom>
+        </p:spPr>
+      </p:pic>
+      <p:sp>
+        <p:nvSpPr>
+          <p:cNvPr id="10" name="Oval 9">
+            <a:extLst>
+              <a:ext uri="{FF2B5EF4-FFF2-40B4-BE49-F238E27FC236}">
+                <a16:creationId xmlns:a16="http://schemas.microsoft.com/office/drawing/2014/main" id="{7D563B74-4EC6-41E0-55D9-72DEAB514C79}"/>
+              </a:ext>
+            </a:extLst>
+          </p:cNvPr>
+          <p:cNvSpPr/>
+          <p:nvPr/>
+        </p:nvSpPr>
+        <p:spPr>
+          <a:xfrm>
+            <a:off x="9860664" y="4396539"/>
+            <a:ext cx="548486" cy="492982"/>
+          </a:xfrm>
+          <a:prstGeom prst="ellipse">
+            <a:avLst/>
+          </a:prstGeom>
+          <a:solidFill>
+            <a:srgbClr val="FF0000"/>
+          </a:solidFill>
+        </p:spPr>
+        <p:style>
+          <a:lnRef idx="2">
+            <a:schemeClr val="accent1">
+              <a:shade val="15000"/>
+            </a:schemeClr>
+          </a:lnRef>
+          <a:fillRef idx="1">
+            <a:schemeClr val="accent1"/>
+          </a:fillRef>
+          <a:effectRef idx="0">
+            <a:schemeClr val="accent1"/>
+          </a:effectRef>
+          <a:fontRef idx="minor">
+            <a:schemeClr val="lt1"/>
+          </a:fontRef>
+        </p:style>
+        <p:txBody>
+          <a:bodyPr rtlCol="0" anchor="ctr"/>
+          <a:lstStyle/>
+          <a:p>
+            <a:pPr algn="ctr"/>
+            <a:r>
+              <a:rPr lang="en-US" sz="1200" dirty="0"/>
+              <a:t>2.2</a:t>
+            </a:r>
+            <a:endParaRPr lang="en-US" dirty="0"/>
+          </a:p>
+        </p:txBody>
+      </p:sp>
+      <p:sp>
+        <p:nvSpPr>
+          <p:cNvPr id="14" name="Oval 13">
+            <a:extLst>
+              <a:ext uri="{FF2B5EF4-FFF2-40B4-BE49-F238E27FC236}">
+                <a16:creationId xmlns:a16="http://schemas.microsoft.com/office/drawing/2014/main" id="{464FC1F4-2E40-6EC6-F5D4-02427BDC312C}"/>
+              </a:ext>
+            </a:extLst>
+          </p:cNvPr>
+          <p:cNvSpPr/>
+          <p:nvPr/>
+        </p:nvSpPr>
+        <p:spPr>
+          <a:xfrm>
+            <a:off x="6616514" y="4071595"/>
+            <a:ext cx="548486" cy="492982"/>
+          </a:xfrm>
+          <a:prstGeom prst="ellipse">
+            <a:avLst/>
+          </a:prstGeom>
+          <a:solidFill>
+            <a:srgbClr val="FF0000"/>
+          </a:solidFill>
+        </p:spPr>
+        <p:style>
+          <a:lnRef idx="2">
+            <a:schemeClr val="accent1">
+              <a:shade val="15000"/>
+            </a:schemeClr>
+          </a:lnRef>
+          <a:fillRef idx="1">
+            <a:schemeClr val="accent1"/>
+          </a:fillRef>
+          <a:effectRef idx="0">
+            <a:schemeClr val="accent1"/>
+          </a:effectRef>
+          <a:fontRef idx="minor">
+            <a:schemeClr val="lt1"/>
+          </a:fontRef>
+        </p:style>
+        <p:txBody>
+          <a:bodyPr rtlCol="0" anchor="ctr"/>
+          <a:lstStyle/>
+          <a:p>
+            <a:pPr algn="ctr"/>
+            <a:r>
+              <a:rPr lang="en-US" sz="1200" dirty="0"/>
+              <a:t>2</a:t>
+            </a:r>
+            <a:endParaRPr lang="en-US" dirty="0"/>
+          </a:p>
+        </p:txBody>
+      </p:sp>
+      <p:sp>
+        <p:nvSpPr>
+          <p:cNvPr id="15" name="Oval 14">
+            <a:extLst>
+              <a:ext uri="{FF2B5EF4-FFF2-40B4-BE49-F238E27FC236}">
+                <a16:creationId xmlns:a16="http://schemas.microsoft.com/office/drawing/2014/main" id="{B8EC3C0F-BE3F-B018-81F8-9FD52A8BB480}"/>
+              </a:ext>
+            </a:extLst>
+          </p:cNvPr>
+          <p:cNvSpPr/>
+          <p:nvPr/>
+        </p:nvSpPr>
+        <p:spPr>
+          <a:xfrm>
+            <a:off x="3874392" y="5937939"/>
+            <a:ext cx="548486" cy="492982"/>
+          </a:xfrm>
+          <a:prstGeom prst="ellipse">
+            <a:avLst/>
+          </a:prstGeom>
+          <a:solidFill>
+            <a:srgbClr val="FF0000"/>
+          </a:solidFill>
+        </p:spPr>
+        <p:style>
+          <a:lnRef idx="2">
+            <a:schemeClr val="accent1">
+              <a:shade val="15000"/>
+            </a:schemeClr>
+          </a:lnRef>
+          <a:fillRef idx="1">
+            <a:schemeClr val="accent1"/>
+          </a:fillRef>
+          <a:effectRef idx="0">
+            <a:schemeClr val="accent1"/>
+          </a:effectRef>
+          <a:fontRef idx="minor">
+            <a:schemeClr val="lt1"/>
+          </a:fontRef>
+        </p:style>
+        <p:txBody>
+          <a:bodyPr rtlCol="0" anchor="ctr"/>
+          <a:lstStyle/>
+          <a:p>
+            <a:pPr algn="ctr"/>
+            <a:r>
+              <a:rPr lang="en-US" sz="1200" dirty="0"/>
+              <a:t>1</a:t>
+            </a:r>
+            <a:endParaRPr lang="en-US" dirty="0"/>
+          </a:p>
+        </p:txBody>
+      </p:sp>
+      <p:sp>
+        <p:nvSpPr>
+          <p:cNvPr id="16" name="Oval 15">
+            <a:extLst>
+              <a:ext uri="{FF2B5EF4-FFF2-40B4-BE49-F238E27FC236}">
+                <a16:creationId xmlns:a16="http://schemas.microsoft.com/office/drawing/2014/main" id="{016E5262-C0D4-3993-EB6D-37D04193371C}"/>
+              </a:ext>
+            </a:extLst>
+          </p:cNvPr>
+          <p:cNvSpPr/>
+          <p:nvPr/>
+        </p:nvSpPr>
+        <p:spPr>
+          <a:xfrm>
+            <a:off x="2612164" y="2859327"/>
+            <a:ext cx="548486" cy="492982"/>
+          </a:xfrm>
+          <a:prstGeom prst="ellipse">
+            <a:avLst/>
+          </a:prstGeom>
+          <a:solidFill>
+            <a:srgbClr val="FF0000"/>
+          </a:solidFill>
+        </p:spPr>
+        <p:style>
+          <a:lnRef idx="2">
+            <a:schemeClr val="accent1">
+              <a:shade val="15000"/>
+            </a:schemeClr>
+          </a:lnRef>
+          <a:fillRef idx="1">
+            <a:schemeClr val="accent1"/>
+          </a:fillRef>
+          <a:effectRef idx="0">
+            <a:schemeClr val="accent1"/>
+          </a:effectRef>
+          <a:fontRef idx="minor">
+            <a:schemeClr val="lt1"/>
+          </a:fontRef>
+        </p:style>
+        <p:txBody>
+          <a:bodyPr rtlCol="0" anchor="ctr"/>
+          <a:lstStyle/>
+          <a:p>
+            <a:pPr algn="ctr"/>
+            <a:r>
+              <a:rPr lang="en-US" sz="1200" dirty="0"/>
+              <a:t>3</a:t>
+            </a:r>
+            <a:endParaRPr lang="en-US" dirty="0"/>
+          </a:p>
+        </p:txBody>
+      </p:sp>
+      <p:sp>
+        <p:nvSpPr>
+          <p:cNvPr id="17" name="Oval 16">
+            <a:extLst>
+              <a:ext uri="{FF2B5EF4-FFF2-40B4-BE49-F238E27FC236}">
+                <a16:creationId xmlns:a16="http://schemas.microsoft.com/office/drawing/2014/main" id="{47DD344F-D9BE-85FC-F275-62319527ABA7}"/>
+              </a:ext>
+            </a:extLst>
+          </p:cNvPr>
+          <p:cNvSpPr/>
+          <p:nvPr/>
+        </p:nvSpPr>
+        <p:spPr>
+          <a:xfrm>
+            <a:off x="7190139" y="4071595"/>
+            <a:ext cx="548486" cy="492982"/>
+          </a:xfrm>
+          <a:prstGeom prst="ellipse">
+            <a:avLst/>
+          </a:prstGeom>
+          <a:solidFill>
+            <a:srgbClr val="FF0000"/>
+          </a:solidFill>
+        </p:spPr>
+        <p:style>
+          <a:lnRef idx="2">
+            <a:schemeClr val="accent1">
+              <a:shade val="15000"/>
+            </a:schemeClr>
+          </a:lnRef>
+          <a:fillRef idx="1">
+            <a:schemeClr val="accent1"/>
+          </a:fillRef>
+          <a:effectRef idx="0">
+            <a:schemeClr val="accent1"/>
+          </a:effectRef>
+          <a:fontRef idx="minor">
+            <a:schemeClr val="lt1"/>
+          </a:fontRef>
+        </p:style>
+        <p:txBody>
+          <a:bodyPr rtlCol="0" anchor="ctr"/>
+          <a:lstStyle/>
+          <a:p>
+            <a:pPr algn="ctr"/>
+            <a:r>
+              <a:rPr lang="en-US" sz="1200" dirty="0"/>
+              <a:t>4</a:t>
+            </a:r>
+            <a:endParaRPr lang="en-US" dirty="0"/>
+          </a:p>
+        </p:txBody>
+      </p:sp>
+      <p:sp>
+        <p:nvSpPr>
+          <p:cNvPr id="18" name="Oval 17">
+            <a:extLst>
+              <a:ext uri="{FF2B5EF4-FFF2-40B4-BE49-F238E27FC236}">
+                <a16:creationId xmlns:a16="http://schemas.microsoft.com/office/drawing/2014/main" id="{F836AA28-4E53-B98B-1D4D-4C15524E67EB}"/>
+              </a:ext>
+            </a:extLst>
+          </p:cNvPr>
+          <p:cNvSpPr/>
+          <p:nvPr/>
+        </p:nvSpPr>
+        <p:spPr>
+          <a:xfrm>
+            <a:off x="3223983" y="2869679"/>
+            <a:ext cx="548486" cy="492982"/>
+          </a:xfrm>
+          <a:prstGeom prst="ellipse">
+            <a:avLst/>
+          </a:prstGeom>
+          <a:solidFill>
+            <a:srgbClr val="FF0000"/>
+          </a:solidFill>
+        </p:spPr>
+        <p:style>
+          <a:lnRef idx="2">
+            <a:schemeClr val="accent1">
+              <a:shade val="15000"/>
+            </a:schemeClr>
+          </a:lnRef>
+          <a:fillRef idx="1">
+            <a:schemeClr val="accent1"/>
+          </a:fillRef>
+          <a:effectRef idx="0">
+            <a:schemeClr val="accent1"/>
+          </a:effectRef>
+          <a:fontRef idx="minor">
+            <a:schemeClr val="lt1"/>
+          </a:fontRef>
+        </p:style>
+        <p:txBody>
+          <a:bodyPr rtlCol="0" anchor="ctr"/>
+          <a:lstStyle/>
+          <a:p>
+            <a:pPr algn="ctr"/>
+            <a:r>
+              <a:rPr lang="en-US" sz="1200" dirty="0"/>
+              <a:t>5</a:t>
+            </a:r>
+            <a:endParaRPr lang="en-US" dirty="0"/>
+          </a:p>
+        </p:txBody>
+      </p:sp>
+      <p:sp>
+        <p:nvSpPr>
+          <p:cNvPr id="20" name="Oval 19">
+            <a:extLst>
+              <a:ext uri="{FF2B5EF4-FFF2-40B4-BE49-F238E27FC236}">
+                <a16:creationId xmlns:a16="http://schemas.microsoft.com/office/drawing/2014/main" id="{79965CF4-0B7A-1A90-D374-E17EA3EE24FA}"/>
+              </a:ext>
+            </a:extLst>
+          </p:cNvPr>
+          <p:cNvSpPr/>
+          <p:nvPr/>
+        </p:nvSpPr>
+        <p:spPr>
+          <a:xfrm>
+            <a:off x="8104148" y="5034635"/>
+            <a:ext cx="548486" cy="492982"/>
+          </a:xfrm>
+          <a:prstGeom prst="ellipse">
+            <a:avLst/>
+          </a:prstGeom>
+          <a:solidFill>
+            <a:srgbClr val="FF0000"/>
+          </a:solidFill>
+        </p:spPr>
+        <p:style>
+          <a:lnRef idx="2">
+            <a:schemeClr val="accent1">
+              <a:shade val="15000"/>
+            </a:schemeClr>
+          </a:lnRef>
+          <a:fillRef idx="1">
+            <a:schemeClr val="accent1"/>
+          </a:fillRef>
+          <a:effectRef idx="0">
+            <a:schemeClr val="accent1"/>
+          </a:effectRef>
+          <a:fontRef idx="minor">
+            <a:schemeClr val="lt1"/>
+          </a:fontRef>
+        </p:style>
+        <p:txBody>
+          <a:bodyPr rtlCol="0" anchor="ctr"/>
+          <a:lstStyle/>
+          <a:p>
+            <a:pPr algn="ctr"/>
+            <a:r>
+              <a:rPr lang="en-US" sz="1200" dirty="0"/>
+              <a:t>2.1</a:t>
+            </a:r>
+            <a:endParaRPr lang="en-US" dirty="0"/>
+          </a:p>
+        </p:txBody>
+      </p:sp>
+      <p:sp>
+        <p:nvSpPr>
+          <p:cNvPr id="21" name="Oval 20">
+            <a:extLst>
+              <a:ext uri="{FF2B5EF4-FFF2-40B4-BE49-F238E27FC236}">
+                <a16:creationId xmlns:a16="http://schemas.microsoft.com/office/drawing/2014/main" id="{55ABED35-2276-17C6-A430-1072763B2641}"/>
+              </a:ext>
+            </a:extLst>
+          </p:cNvPr>
+          <p:cNvSpPr/>
+          <p:nvPr/>
+        </p:nvSpPr>
+        <p:spPr>
+          <a:xfrm>
+            <a:off x="8118961" y="6073335"/>
+            <a:ext cx="548486" cy="492982"/>
+          </a:xfrm>
+          <a:prstGeom prst="ellipse">
+            <a:avLst/>
+          </a:prstGeom>
+          <a:solidFill>
+            <a:srgbClr val="FF0000"/>
+          </a:solidFill>
+        </p:spPr>
+        <p:style>
+          <a:lnRef idx="2">
+            <a:schemeClr val="accent1">
+              <a:shade val="15000"/>
+            </a:schemeClr>
+          </a:lnRef>
+          <a:fillRef idx="1">
+            <a:schemeClr val="accent1"/>
+          </a:fillRef>
+          <a:effectRef idx="0">
+            <a:schemeClr val="accent1"/>
+          </a:effectRef>
+          <a:fontRef idx="minor">
+            <a:schemeClr val="lt1"/>
+          </a:fontRef>
+        </p:style>
+        <p:txBody>
+          <a:bodyPr rtlCol="0" anchor="ctr"/>
+          <a:lstStyle/>
+          <a:p>
+            <a:pPr algn="ctr"/>
+            <a:r>
+              <a:rPr lang="en-US" sz="1200" dirty="0"/>
+              <a:t>2.3</a:t>
+            </a:r>
+            <a:endParaRPr lang="en-US" dirty="0"/>
+          </a:p>
+        </p:txBody>
+      </p:sp>
+    </p:spTree>
+    <p:extLst>
+      <p:ext uri="{BB962C8B-B14F-4D97-AF65-F5344CB8AC3E}">
+        <p14:creationId xmlns:p14="http://schemas.microsoft.com/office/powerpoint/2010/main" val="862977130"/>
+      </p:ext>
+    </p:extLst>
+  </p:cSld>
+  <p:clrMapOvr>
+    <a:masterClrMapping/>
+  </p:clrMapOvr>
+</p:sld>
+</file>
+
+<file path=ppt/slides/slide53.xml><?xml version="1.0" encoding="utf-8"?>
+<p:sld xmlns:a="http://schemas.openxmlformats.org/drawingml/2006/main" xmlns:r="http://schemas.openxmlformats.org/officeDocument/2006/relationships" xmlns:p="http://schemas.openxmlformats.org/presentationml/2006/main">
+  <p:cSld>
+    <p:spTree>
+      <p:nvGrpSpPr>
+        <p:cNvPr id="1" name=""/>
+        <p:cNvGrpSpPr/>
+        <p:nvPr/>
+      </p:nvGrpSpPr>
+      <p:grpSpPr>
+        <a:xfrm>
+          <a:off x="0" y="0"/>
+          <a:ext cx="0" cy="0"/>
+          <a:chOff x="0" y="0"/>
+          <a:chExt cx="0" cy="0"/>
+        </a:xfrm>
+      </p:grpSpPr>
+      <p:sp>
+        <p:nvSpPr>
+          <p:cNvPr id="2" name="Title 1">
+            <a:extLst>
+              <a:ext uri="{FF2B5EF4-FFF2-40B4-BE49-F238E27FC236}">
+                <a16:creationId xmlns:a16="http://schemas.microsoft.com/office/drawing/2014/main" id="{0F3F56CA-C931-67D7-6382-29F1CF339A1F}"/>
+              </a:ext>
+            </a:extLst>
+          </p:cNvPr>
+          <p:cNvSpPr>
+            <a:spLocks noGrp="1"/>
+          </p:cNvSpPr>
+          <p:nvPr>
+            <p:ph type="title"/>
+          </p:nvPr>
+        </p:nvSpPr>
+        <p:spPr/>
+        <p:txBody>
+          <a:bodyPr/>
+          <a:lstStyle/>
+          <a:p>
+            <a:r>
+              <a:rPr lang="en-US" dirty="0" err="1"/>
+              <a:t>NgRX</a:t>
+            </a:r>
+            <a:r>
+              <a:rPr lang="en-US" dirty="0"/>
+              <a:t> - Setup</a:t>
+            </a:r>
+          </a:p>
+        </p:txBody>
+      </p:sp>
+      <p:sp>
+        <p:nvSpPr>
+          <p:cNvPr id="3" name="Content Placeholder 2">
+            <a:extLst>
+              <a:ext uri="{FF2B5EF4-FFF2-40B4-BE49-F238E27FC236}">
+                <a16:creationId xmlns:a16="http://schemas.microsoft.com/office/drawing/2014/main" id="{87EF7DBD-DD82-42F4-40A7-8516331285B8}"/>
+              </a:ext>
+            </a:extLst>
+          </p:cNvPr>
+          <p:cNvSpPr>
+            <a:spLocks noGrp="1"/>
+          </p:cNvSpPr>
+          <p:nvPr>
+            <p:ph idx="1"/>
+          </p:nvPr>
+        </p:nvSpPr>
+        <p:spPr/>
+        <p:txBody>
+          <a:bodyPr>
+            <a:normAutofit/>
+          </a:bodyPr>
+          <a:lstStyle/>
+          <a:p>
+            <a:r>
+              <a:rPr lang="en-US" dirty="0"/>
+              <a:t>Install packages with ng CLI:</a:t>
+            </a:r>
+            <a:br>
+              <a:rPr lang="en-US" dirty="0"/>
+            </a:br>
+            <a:br>
+              <a:rPr lang="en-US" dirty="0"/>
+            </a:br>
+            <a:r>
+              <a:rPr lang="en-US" b="1" dirty="0"/>
+              <a:t>ng add @ngrx/store</a:t>
+            </a:r>
+            <a:br>
+              <a:rPr lang="en-US" b="1" dirty="0"/>
+            </a:br>
+            <a:r>
+              <a:rPr lang="en-US" b="1" dirty="0"/>
+              <a:t>ng add @ngrx/effects</a:t>
+            </a:r>
+          </a:p>
+        </p:txBody>
+      </p:sp>
+      <p:pic>
+        <p:nvPicPr>
+          <p:cNvPr id="11" name="Picture 10">
+            <a:extLst>
+              <a:ext uri="{FF2B5EF4-FFF2-40B4-BE49-F238E27FC236}">
+                <a16:creationId xmlns:a16="http://schemas.microsoft.com/office/drawing/2014/main" id="{71E3F82A-5078-761F-BAFA-85E73E3FB312}"/>
+              </a:ext>
+            </a:extLst>
+          </p:cNvPr>
+          <p:cNvPicPr>
+            <a:picLocks noChangeAspect="1"/>
+          </p:cNvPicPr>
+          <p:nvPr/>
+        </p:nvPicPr>
+        <p:blipFill>
+          <a:blip r:embed="rId2"/>
+          <a:stretch>
+            <a:fillRect/>
+          </a:stretch>
+        </p:blipFill>
+        <p:spPr>
+          <a:xfrm>
+            <a:off x="5545608" y="1027906"/>
+            <a:ext cx="6433051" cy="5185293"/>
+          </a:xfrm>
+          <a:prstGeom prst="rect">
+            <a:avLst/>
+          </a:prstGeom>
+        </p:spPr>
+      </p:pic>
+    </p:spTree>
+    <p:extLst>
+      <p:ext uri="{BB962C8B-B14F-4D97-AF65-F5344CB8AC3E}">
+        <p14:creationId xmlns:p14="http://schemas.microsoft.com/office/powerpoint/2010/main" val="1222914190"/>
       </p:ext>
     </p:extLst>
   </p:cSld>
@@ -14341,4 +17444,319 @@
     </a:ext>
   </a:extLst>
 </a:theme>
+</file>
+
+<file path=ppt/theme/theme2.xml><?xml version="1.0" encoding="utf-8"?>
+<a:theme xmlns:a="http://schemas.openxmlformats.org/drawingml/2006/main" name="Office Theme">
+  <a:themeElements>
+    <a:clrScheme name="Office">
+      <a:dk1>
+        <a:sysClr val="windowText" lastClr="000000"/>
+      </a:dk1>
+      <a:lt1>
+        <a:sysClr val="window" lastClr="FFFFFF"/>
+      </a:lt1>
+      <a:dk2>
+        <a:srgbClr val="0E2841"/>
+      </a:dk2>
+      <a:lt2>
+        <a:srgbClr val="E8E8E8"/>
+      </a:lt2>
+      <a:accent1>
+        <a:srgbClr val="156082"/>
+      </a:accent1>
+      <a:accent2>
+        <a:srgbClr val="E97132"/>
+      </a:accent2>
+      <a:accent3>
+        <a:srgbClr val="196B24"/>
+      </a:accent3>
+      <a:accent4>
+        <a:srgbClr val="0F9ED5"/>
+      </a:accent4>
+      <a:accent5>
+        <a:srgbClr val="A02B93"/>
+      </a:accent5>
+      <a:accent6>
+        <a:srgbClr val="4EA72E"/>
+      </a:accent6>
+      <a:hlink>
+        <a:srgbClr val="467886"/>
+      </a:hlink>
+      <a:folHlink>
+        <a:srgbClr val="96607D"/>
+      </a:folHlink>
+    </a:clrScheme>
+    <a:fontScheme name="Office">
+      <a:majorFont>
+        <a:latin typeface="Aptos Display" panose="02110004020202020204"/>
+        <a:ea typeface=""/>
+        <a:cs typeface=""/>
+        <a:font script="Jpan" typeface="游ゴシック Light"/>
+        <a:font script="Hang" typeface="맑은 고딕"/>
+        <a:font script="Hans" typeface="等线 Light"/>
+        <a:font script="Hant" typeface="新細明體"/>
+        <a:font script="Arab" typeface="Times New Roman"/>
+        <a:font script="Hebr" typeface="Times New Roman"/>
+        <a:font script="Thai" typeface="Angsana New"/>
+        <a:font script="Ethi" typeface="Nyala"/>
+        <a:font script="Beng" typeface="Vrinda"/>
+        <a:font script="Gujr" typeface="Shruti"/>
+        <a:font script="Khmr" typeface="MoolBoran"/>
+        <a:font script="Knda" typeface="Tunga"/>
+        <a:font script="Guru" typeface="Raavi"/>
+        <a:font script="Cans" typeface="Euphemia"/>
+        <a:font script="Cher" typeface="Plantagenet Cherokee"/>
+        <a:font script="Yiii" typeface="Microsoft Yi Baiti"/>
+        <a:font script="Tibt" typeface="Microsoft Himalaya"/>
+        <a:font script="Thaa" typeface="MV Boli"/>
+        <a:font script="Deva" typeface="Mangal"/>
+        <a:font script="Telu" typeface="Gautami"/>
+        <a:font script="Taml" typeface="Latha"/>
+        <a:font script="Syrc" typeface="Estrangelo Edessa"/>
+        <a:font script="Orya" typeface="Kalinga"/>
+        <a:font script="Mlym" typeface="Kartika"/>
+        <a:font script="Laoo" typeface="DokChampa"/>
+        <a:font script="Sinh" typeface="Iskoola Pota"/>
+        <a:font script="Mong" typeface="Mongolian Baiti"/>
+        <a:font script="Viet" typeface="Times New Roman"/>
+        <a:font script="Uigh" typeface="Microsoft Uighur"/>
+        <a:font script="Geor" typeface="Sylfaen"/>
+        <a:font script="Armn" typeface="Arial"/>
+        <a:font script="Bugi" typeface="Leelawadee UI"/>
+        <a:font script="Bopo" typeface="Microsoft JhengHei"/>
+        <a:font script="Java" typeface="Javanese Text"/>
+        <a:font script="Lisu" typeface="Segoe UI"/>
+        <a:font script="Mymr" typeface="Myanmar Text"/>
+        <a:font script="Nkoo" typeface="Ebrima"/>
+        <a:font script="Olck" typeface="Nirmala UI"/>
+        <a:font script="Osma" typeface="Ebrima"/>
+        <a:font script="Phag" typeface="Phagspa"/>
+        <a:font script="Syrn" typeface="Estrangelo Edessa"/>
+        <a:font script="Syrj" typeface="Estrangelo Edessa"/>
+        <a:font script="Syre" typeface="Estrangelo Edessa"/>
+        <a:font script="Sora" typeface="Nirmala UI"/>
+        <a:font script="Tale" typeface="Microsoft Tai Le"/>
+        <a:font script="Talu" typeface="Microsoft New Tai Lue"/>
+        <a:font script="Tfng" typeface="Ebrima"/>
+      </a:majorFont>
+      <a:minorFont>
+        <a:latin typeface="Aptos" panose="02110004020202020204"/>
+        <a:ea typeface=""/>
+        <a:cs typeface=""/>
+        <a:font script="Jpan" typeface="游ゴシック"/>
+        <a:font script="Hang" typeface="맑은 고딕"/>
+        <a:font script="Hans" typeface="等线"/>
+        <a:font script="Hant" typeface="新細明體"/>
+        <a:font script="Arab" typeface="Arial"/>
+        <a:font script="Hebr" typeface="Arial"/>
+        <a:font script="Thai" typeface="Cordia New"/>
+        <a:font script="Ethi" typeface="Nyala"/>
+        <a:font script="Beng" typeface="Vrinda"/>
+        <a:font script="Gujr" typeface="Shruti"/>
+        <a:font script="Khmr" typeface="DaunPenh"/>
+        <a:font script="Knda" typeface="Tunga"/>
+        <a:font script="Guru" typeface="Raavi"/>
+        <a:font script="Cans" typeface="Euphemia"/>
+        <a:font script="Cher" typeface="Plantagenet Cherokee"/>
+        <a:font script="Yiii" typeface="Microsoft Yi Baiti"/>
+        <a:font script="Tibt" typeface="Microsoft Himalaya"/>
+        <a:font script="Thaa" typeface="MV Boli"/>
+        <a:font script="Deva" typeface="Mangal"/>
+        <a:font script="Telu" typeface="Gautami"/>
+        <a:font script="Taml" typeface="Latha"/>
+        <a:font script="Syrc" typeface="Estrangelo Edessa"/>
+        <a:font script="Orya" typeface="Kalinga"/>
+        <a:font script="Mlym" typeface="Kartika"/>
+        <a:font script="Laoo" typeface="DokChampa"/>
+        <a:font script="Sinh" typeface="Iskoola Pota"/>
+        <a:font script="Mong" typeface="Mongolian Baiti"/>
+        <a:font script="Viet" typeface="Arial"/>
+        <a:font script="Uigh" typeface="Microsoft Uighur"/>
+        <a:font script="Geor" typeface="Sylfaen"/>
+        <a:font script="Armn" typeface="Arial"/>
+        <a:font script="Bugi" typeface="Leelawadee UI"/>
+        <a:font script="Bopo" typeface="Microsoft JhengHei"/>
+        <a:font script="Java" typeface="Javanese Text"/>
+        <a:font script="Lisu" typeface="Segoe UI"/>
+        <a:font script="Mymr" typeface="Myanmar Text"/>
+        <a:font script="Nkoo" typeface="Ebrima"/>
+        <a:font script="Olck" typeface="Nirmala UI"/>
+        <a:font script="Osma" typeface="Ebrima"/>
+        <a:font script="Phag" typeface="Phagspa"/>
+        <a:font script="Syrn" typeface="Estrangelo Edessa"/>
+        <a:font script="Syrj" typeface="Estrangelo Edessa"/>
+        <a:font script="Syre" typeface="Estrangelo Edessa"/>
+        <a:font script="Sora" typeface="Nirmala UI"/>
+        <a:font script="Tale" typeface="Microsoft Tai Le"/>
+        <a:font script="Talu" typeface="Microsoft New Tai Lue"/>
+        <a:font script="Tfng" typeface="Ebrima"/>
+      </a:minorFont>
+    </a:fontScheme>
+    <a:fmtScheme name="Office">
+      <a:fillStyleLst>
+        <a:solidFill>
+          <a:schemeClr val="phClr"/>
+        </a:solidFill>
+        <a:gradFill rotWithShape="1">
+          <a:gsLst>
+            <a:gs pos="0">
+              <a:schemeClr val="phClr">
+                <a:lumMod val="110000"/>
+                <a:satMod val="105000"/>
+                <a:tint val="67000"/>
+              </a:schemeClr>
+            </a:gs>
+            <a:gs pos="50000">
+              <a:schemeClr val="phClr">
+                <a:lumMod val="105000"/>
+                <a:satMod val="103000"/>
+                <a:tint val="73000"/>
+              </a:schemeClr>
+            </a:gs>
+            <a:gs pos="100000">
+              <a:schemeClr val="phClr">
+                <a:lumMod val="105000"/>
+                <a:satMod val="109000"/>
+                <a:tint val="81000"/>
+              </a:schemeClr>
+            </a:gs>
+          </a:gsLst>
+          <a:lin ang="5400000" scaled="0"/>
+        </a:gradFill>
+        <a:gradFill rotWithShape="1">
+          <a:gsLst>
+            <a:gs pos="0">
+              <a:schemeClr val="phClr">
+                <a:satMod val="103000"/>
+                <a:lumMod val="102000"/>
+                <a:tint val="94000"/>
+              </a:schemeClr>
+            </a:gs>
+            <a:gs pos="50000">
+              <a:schemeClr val="phClr">
+                <a:satMod val="110000"/>
+                <a:lumMod val="100000"/>
+                <a:shade val="100000"/>
+              </a:schemeClr>
+            </a:gs>
+            <a:gs pos="100000">
+              <a:schemeClr val="phClr">
+                <a:lumMod val="99000"/>
+                <a:satMod val="120000"/>
+                <a:shade val="78000"/>
+              </a:schemeClr>
+            </a:gs>
+          </a:gsLst>
+          <a:lin ang="5400000" scaled="0"/>
+        </a:gradFill>
+      </a:fillStyleLst>
+      <a:lnStyleLst>
+        <a:ln w="12700" cap="flat" cmpd="sng" algn="ctr">
+          <a:solidFill>
+            <a:schemeClr val="phClr"/>
+          </a:solidFill>
+          <a:prstDash val="solid"/>
+          <a:miter lim="800000"/>
+        </a:ln>
+        <a:ln w="19050" cap="flat" cmpd="sng" algn="ctr">
+          <a:solidFill>
+            <a:schemeClr val="phClr"/>
+          </a:solidFill>
+          <a:prstDash val="solid"/>
+          <a:miter lim="800000"/>
+        </a:ln>
+        <a:ln w="25400" cap="flat" cmpd="sng" algn="ctr">
+          <a:solidFill>
+            <a:schemeClr val="phClr"/>
+          </a:solidFill>
+          <a:prstDash val="solid"/>
+          <a:miter lim="800000"/>
+        </a:ln>
+      </a:lnStyleLst>
+      <a:effectStyleLst>
+        <a:effectStyle>
+          <a:effectLst/>
+        </a:effectStyle>
+        <a:effectStyle>
+          <a:effectLst/>
+        </a:effectStyle>
+        <a:effectStyle>
+          <a:effectLst>
+            <a:outerShdw blurRad="57150" dist="19050" dir="5400000" algn="ctr" rotWithShape="0">
+              <a:srgbClr val="000000">
+                <a:alpha val="63000"/>
+              </a:srgbClr>
+            </a:outerShdw>
+          </a:effectLst>
+        </a:effectStyle>
+      </a:effectStyleLst>
+      <a:bgFillStyleLst>
+        <a:solidFill>
+          <a:schemeClr val="phClr"/>
+        </a:solidFill>
+        <a:solidFill>
+          <a:schemeClr val="phClr">
+            <a:tint val="95000"/>
+            <a:satMod val="170000"/>
+          </a:schemeClr>
+        </a:solidFill>
+        <a:gradFill rotWithShape="1">
+          <a:gsLst>
+            <a:gs pos="0">
+              <a:schemeClr val="phClr">
+                <a:tint val="93000"/>
+                <a:satMod val="150000"/>
+                <a:shade val="98000"/>
+                <a:lumMod val="102000"/>
+              </a:schemeClr>
+            </a:gs>
+            <a:gs pos="50000">
+              <a:schemeClr val="phClr">
+                <a:tint val="98000"/>
+                <a:satMod val="130000"/>
+                <a:shade val="90000"/>
+                <a:lumMod val="103000"/>
+              </a:schemeClr>
+            </a:gs>
+            <a:gs pos="100000">
+              <a:schemeClr val="phClr">
+                <a:shade val="63000"/>
+                <a:satMod val="120000"/>
+              </a:schemeClr>
+            </a:gs>
+          </a:gsLst>
+          <a:lin ang="5400000" scaled="0"/>
+        </a:gradFill>
+      </a:bgFillStyleLst>
+    </a:fmtScheme>
+  </a:themeElements>
+  <a:objectDefaults>
+    <a:lnDef>
+      <a:spPr/>
+      <a:bodyPr/>
+      <a:lstStyle/>
+      <a:style>
+        <a:lnRef idx="2">
+          <a:schemeClr val="accent1"/>
+        </a:lnRef>
+        <a:fillRef idx="0">
+          <a:schemeClr val="accent1"/>
+        </a:fillRef>
+        <a:effectRef idx="1">
+          <a:schemeClr val="accent1"/>
+        </a:effectRef>
+        <a:fontRef idx="minor">
+          <a:schemeClr val="tx1"/>
+        </a:fontRef>
+      </a:style>
+    </a:lnDef>
+  </a:objectDefaults>
+  <a:extraClrSchemeLst/>
+  <a:extLst>
+    <a:ext uri="{05A4C25C-085E-4340-85A3-A5531E510DB2}">
+      <thm15:themeFamily xmlns:thm15="http://schemas.microsoft.com/office/thememl/2012/main" name="Office Theme" id="{2E142A2C-CD16-42D6-873A-C26D2A0506FA}" vid="{1BDDFF52-6CD6-40A5-AB3C-68EB2F1E4D0A}"/>
+    </a:ext>
+  </a:extLst>
+</a:theme>
 </file>
</xml_diff>